<commit_message>
add more WIP slides
Signed-off-by: Sanjula Ganepola <Sanjula.Ganepola@ibm.com>
</commit_message>
<xml_diff>
--- a/Automating Builds in Git on IBM i/Automating-Builds-in-Git-on-IBM-i.pptx
+++ b/Automating Builds in Git on IBM i/Automating-Builds-in-Git-on-IBM-i.pptx
@@ -5,10 +5,10 @@
     <p:sldMasterId id="2147486616" r:id="rId1"/>
   </p:sldMasterIdLst>
   <p:notesMasterIdLst>
-    <p:notesMasterId r:id="rId24"/>
+    <p:notesMasterId r:id="rId28"/>
   </p:notesMasterIdLst>
   <p:handoutMasterIdLst>
-    <p:handoutMasterId r:id="rId25"/>
+    <p:handoutMasterId r:id="rId29"/>
   </p:handoutMasterIdLst>
   <p:sldIdLst>
     <p:sldId id="2142534296" r:id="rId2"/>
@@ -27,12 +27,16 @@
     <p:sldId id="2142534344" r:id="rId15"/>
     <p:sldId id="2142534345" r:id="rId16"/>
     <p:sldId id="2142534351" r:id="rId17"/>
-    <p:sldId id="2142534352" r:id="rId18"/>
-    <p:sldId id="2142534353" r:id="rId19"/>
-    <p:sldId id="2142534354" r:id="rId20"/>
-    <p:sldId id="2142534321" r:id="rId21"/>
-    <p:sldId id="2142534301" r:id="rId22"/>
-    <p:sldId id="2142534340" r:id="rId23"/>
+    <p:sldId id="2142534357" r:id="rId18"/>
+    <p:sldId id="2142534352" r:id="rId19"/>
+    <p:sldId id="2142534358" r:id="rId20"/>
+    <p:sldId id="2142534332" r:id="rId21"/>
+    <p:sldId id="2142534353" r:id="rId22"/>
+    <p:sldId id="2142534354" r:id="rId23"/>
+    <p:sldId id="2142534321" r:id="rId24"/>
+    <p:sldId id="2142534340" r:id="rId25"/>
+    <p:sldId id="2626" r:id="rId26"/>
+    <p:sldId id="2142534301" r:id="rId27"/>
   </p:sldIdLst>
   <p:sldSz cx="12192000" cy="6858000"/>
   <p:notesSz cx="7010400" cy="9296400"/>
@@ -270,7 +274,7 @@
           <a:p>
             <a:fld id="{F8A71C4C-FF3F-0C4F-8795-A2475369391B}" type="datetime1">
               <a:rPr lang="en-US" smtClean="0"/>
-              <a:t>9/9/2024</a:t>
+              <a:t>9/12/2024</a:t>
             </a:fld>
             <a:endParaRPr lang="en-US" dirty="0"/>
           </a:p>
@@ -445,7 +449,7 @@
             </a:pPr>
             <a:fld id="{575E4D0F-365E-634C-91A3-A7A1E50E5DCF}" type="datetime1">
               <a:rPr lang="en-US" smtClean="0"/>
-              <a:t>9/9/2024</a:t>
+              <a:t>9/12/2024</a:t>
             </a:fld>
             <a:endParaRPr lang="en-US" dirty="0"/>
           </a:p>
@@ -824,7 +828,7 @@
               <a:pPr>
                 <a:defRPr/>
               </a:pPr>
-              <a:t>20</a:t>
+              <a:t>23</a:t>
             </a:fld>
             <a:endParaRPr lang="en-US" dirty="0"/>
           </a:p>
@@ -25914,7 +25918,12 @@
             <p:ph type="body" sz="quarter" idx="15"/>
           </p:nvPr>
         </p:nvSpPr>
-        <p:spPr/>
+        <p:spPr>
+          <a:xfrm>
+            <a:off x="310896" y="832104"/>
+            <a:ext cx="5427917" cy="5414147"/>
+          </a:xfrm>
+        </p:spPr>
         <p:txBody>
           <a:bodyPr/>
           <a:lstStyle/>
@@ -25923,11 +25932,155 @@
               <a:rPr lang="en-CA" dirty="0">
                 <a:latin typeface="+mj-lt"/>
               </a:rPr>
-              <a:t>WIP</a:t>
-            </a:r>
+              <a:t>A dependency management CLI tool</a:t>
+            </a:r>
+          </a:p>
+          <a:p>
+            <a:pPr lvl="1"/>
+            <a:r>
+              <a:rPr lang="en-CA" dirty="0">
+                <a:latin typeface="+mj-lt"/>
+              </a:rPr>
+              <a:t>Build </a:t>
+            </a:r>
+            <a:r>
+              <a:rPr lang="en-US" dirty="0">
+                <a:latin typeface="+mj-lt"/>
+              </a:rPr>
+              <a:t>dependency tree for RPGLE, DDS, SQL, CL, etc.</a:t>
+            </a:r>
+          </a:p>
+          <a:p>
+            <a:pPr lvl="1"/>
+            <a:endParaRPr lang="en-US" dirty="0">
+              <a:latin typeface="+mj-lt"/>
+            </a:endParaRPr>
+          </a:p>
+          <a:p>
+            <a:pPr lvl="1"/>
+            <a:r>
+              <a:rPr lang="en-US" dirty="0">
+                <a:latin typeface="+mj-lt"/>
+              </a:rPr>
+              <a:t>Generates impact analysis information</a:t>
+            </a:r>
+          </a:p>
+          <a:p>
+            <a:pPr lvl="1"/>
+            <a:endParaRPr lang="en-US" dirty="0">
+              <a:latin typeface="+mj-lt"/>
+            </a:endParaRPr>
+          </a:p>
+          <a:p>
+            <a:pPr lvl="1"/>
+            <a:r>
+              <a:rPr lang="en-US" dirty="0">
+                <a:latin typeface="+mj-lt"/>
+              </a:rPr>
+              <a:t>Generate scripts to automate builds</a:t>
+            </a:r>
+          </a:p>
+          <a:p>
+            <a:pPr lvl="1"/>
+            <a:endParaRPr lang="en-US" dirty="0">
+              <a:latin typeface="+mj-lt"/>
+            </a:endParaRPr>
+          </a:p>
+          <a:p>
+            <a:pPr lvl="1"/>
+            <a:r>
+              <a:rPr lang="en-US" dirty="0">
+                <a:latin typeface="+mj-lt"/>
+              </a:rPr>
+              <a:t>Clean up project</a:t>
+            </a:r>
+          </a:p>
+          <a:p>
+            <a:endParaRPr lang="en-US" dirty="0">
+              <a:latin typeface="+mj-lt"/>
+            </a:endParaRPr>
+          </a:p>
+          <a:p>
+            <a:endParaRPr lang="en-CA" dirty="0">
+              <a:latin typeface="+mj-lt"/>
+            </a:endParaRPr>
           </a:p>
         </p:txBody>
       </p:sp>
+      <p:pic>
+        <p:nvPicPr>
+          <p:cNvPr id="3" name="Picture 2">
+            <a:extLst>
+              <a:ext uri="{FF2B5EF4-FFF2-40B4-BE49-F238E27FC236}">
+                <a16:creationId xmlns:a16="http://schemas.microsoft.com/office/drawing/2014/main" id="{F75BD49F-2998-C5DE-BF8F-F01C000F39A9}"/>
+              </a:ext>
+            </a:extLst>
+          </p:cNvPr>
+          <p:cNvPicPr>
+            <a:picLocks noChangeAspect="1"/>
+          </p:cNvPicPr>
+          <p:nvPr/>
+        </p:nvPicPr>
+        <p:blipFill>
+          <a:blip r:embed="rId2"/>
+          <a:stretch>
+            <a:fillRect/>
+          </a:stretch>
+        </p:blipFill>
+        <p:spPr>
+          <a:xfrm>
+            <a:off x="513096" y="3612651"/>
+            <a:ext cx="4885684" cy="2735786"/>
+          </a:xfrm>
+          <a:prstGeom prst="rect">
+            <a:avLst/>
+          </a:prstGeom>
+          <a:effectLst>
+            <a:outerShdw blurRad="63500" sx="102000" sy="102000" algn="ctr" rotWithShape="0">
+              <a:prstClr val="black">
+                <a:alpha val="40000"/>
+              </a:prstClr>
+            </a:outerShdw>
+          </a:effectLst>
+        </p:spPr>
+      </p:pic>
+      <p:pic>
+        <p:nvPicPr>
+          <p:cNvPr id="7" name="Picture 6">
+            <a:extLst>
+              <a:ext uri="{FF2B5EF4-FFF2-40B4-BE49-F238E27FC236}">
+                <a16:creationId xmlns:a16="http://schemas.microsoft.com/office/drawing/2014/main" id="{7AA1B27D-71C8-706B-0F40-B0ADA7A898D6}"/>
+              </a:ext>
+            </a:extLst>
+          </p:cNvPr>
+          <p:cNvPicPr>
+            <a:picLocks noChangeAspect="1"/>
+          </p:cNvPicPr>
+          <p:nvPr/>
+        </p:nvPicPr>
+        <p:blipFill>
+          <a:blip r:embed="rId3"/>
+          <a:stretch>
+            <a:fillRect/>
+          </a:stretch>
+        </p:blipFill>
+        <p:spPr>
+          <a:xfrm>
+            <a:off x="5961958" y="984504"/>
+            <a:ext cx="5919146" cy="5363933"/>
+          </a:xfrm>
+          <a:prstGeom prst="rect">
+            <a:avLst/>
+          </a:prstGeom>
+          <a:effectLst>
+            <a:outerShdw blurRad="63500" sx="102000" sy="102000" algn="ctr" rotWithShape="0">
+              <a:prstClr val="black">
+                <a:alpha val="40000"/>
+              </a:prstClr>
+            </a:outerShdw>
+          </a:effectLst>
+        </p:spPr>
+      </p:pic>
     </p:spTree>
     <p:extLst>
       <p:ext uri="{BB962C8B-B14F-4D97-AF65-F5344CB8AC3E}">
@@ -25983,7 +26136,7 @@
               <a:rPr lang="en-CA" b="1" dirty="0">
                 <a:latin typeface="+mj-lt"/>
               </a:rPr>
-              <a:t>Repository Cleanup</a:t>
+              <a:t>Let’s Dissect a Dependency Tree</a:t>
             </a:r>
           </a:p>
         </p:txBody>
@@ -26073,7 +26226,7 @@
               <a:rPr lang="en-CA" b="1" dirty="0">
                 <a:latin typeface="+mj-lt"/>
               </a:rPr>
-              <a:t>Impact Analysis</a:t>
+              <a:t>There is a Source Orbit VS Code Extension for Visualization!</a:t>
             </a:r>
           </a:p>
         </p:txBody>
@@ -26094,7 +26247,12 @@
             <p:ph type="body" sz="quarter" idx="15"/>
           </p:nvPr>
         </p:nvSpPr>
-        <p:spPr/>
+        <p:spPr>
+          <a:xfrm>
+            <a:off x="310896" y="832104"/>
+            <a:ext cx="5785104" cy="5414147"/>
+          </a:xfrm>
+        </p:spPr>
         <p:txBody>
           <a:bodyPr/>
           <a:lstStyle/>
@@ -26103,15 +26261,335 @@
               <a:rPr lang="en-CA" dirty="0">
                 <a:latin typeface="+mj-lt"/>
               </a:rPr>
-              <a:t>WIP</a:t>
+              <a:t>Builds on top of IBM </a:t>
+            </a:r>
+            <a:r>
+              <a:rPr lang="en-CA" dirty="0" err="1">
+                <a:latin typeface="+mj-lt"/>
+              </a:rPr>
+              <a:t>i</a:t>
+            </a:r>
+            <a:r>
+              <a:rPr lang="en-CA" dirty="0">
+                <a:latin typeface="+mj-lt"/>
+              </a:rPr>
+              <a:t> Project Explorer</a:t>
+            </a:r>
+          </a:p>
+          <a:p>
+            <a:endParaRPr lang="en-CA" dirty="0">
+              <a:latin typeface="+mj-lt"/>
+            </a:endParaRPr>
+          </a:p>
+          <a:p>
+            <a:r>
+              <a:rPr lang="en-CA" dirty="0" err="1">
+                <a:latin typeface="+mj-lt"/>
+              </a:rPr>
+              <a:t>Visulize</a:t>
+            </a:r>
+            <a:r>
+              <a:rPr lang="en-CA" dirty="0">
+                <a:latin typeface="+mj-lt"/>
+              </a:rPr>
+              <a:t> dependency tree</a:t>
             </a:r>
           </a:p>
         </p:txBody>
       </p:sp>
+      <p:sp>
+        <p:nvSpPr>
+          <p:cNvPr id="3" name="Text Placeholder 5">
+            <a:extLst>
+              <a:ext uri="{FF2B5EF4-FFF2-40B4-BE49-F238E27FC236}">
+                <a16:creationId xmlns:a16="http://schemas.microsoft.com/office/drawing/2014/main" id="{F977253E-DDEC-0C82-038B-F82E12B26C06}"/>
+              </a:ext>
+            </a:extLst>
+          </p:cNvPr>
+          <p:cNvSpPr txBox="1">
+            <a:spLocks/>
+          </p:cNvSpPr>
+          <p:nvPr/>
+        </p:nvSpPr>
+        <p:spPr>
+          <a:xfrm>
+            <a:off x="9273598" y="721406"/>
+            <a:ext cx="1602571" cy="899999"/>
+          </a:xfrm>
+          <a:prstGeom prst="rect">
+            <a:avLst/>
+          </a:prstGeom>
+        </p:spPr>
+        <p:txBody>
+          <a:bodyPr anchor="ctr"/>
+          <a:lstStyle>
+            <a:lvl1pPr marL="342900" indent="-342900" algn="l" defTabSz="609570" rtl="0" eaLnBrk="1" latinLnBrk="0" hangingPunct="1">
+              <a:lnSpc>
+                <a:spcPct val="100000"/>
+              </a:lnSpc>
+              <a:spcBef>
+                <a:spcPts val="0"/>
+              </a:spcBef>
+              <a:spcAft>
+                <a:spcPts val="0"/>
+              </a:spcAft>
+              <a:buFont typeface="Arial"/>
+              <a:buChar char="•"/>
+              <a:defRPr sz="1800" kern="1200" baseline="0">
+                <a:solidFill>
+                  <a:schemeClr val="tx1"/>
+                </a:solidFill>
+                <a:latin typeface="Arial"/>
+                <a:ea typeface="Arial" panose="020B0604020202020204" pitchFamily="34" charset="0"/>
+                <a:cs typeface="Arial"/>
+              </a:defRPr>
+            </a:lvl1pPr>
+            <a:lvl2pPr marL="740664" indent="-230706" algn="l" defTabSz="609570" rtl="0" eaLnBrk="1" latinLnBrk="0" hangingPunct="1">
+              <a:lnSpc>
+                <a:spcPct val="100000"/>
+              </a:lnSpc>
+              <a:spcBef>
+                <a:spcPts val="0"/>
+              </a:spcBef>
+              <a:spcAft>
+                <a:spcPts val="0"/>
+              </a:spcAft>
+              <a:buFont typeface="Arial"/>
+              <a:buChar char="–"/>
+              <a:defRPr sz="1800" kern="1200">
+                <a:solidFill>
+                  <a:schemeClr val="tx1"/>
+                </a:solidFill>
+                <a:latin typeface="Arial"/>
+                <a:ea typeface="Arial" panose="020B0604020202020204" pitchFamily="34" charset="0"/>
+                <a:cs typeface="Arial"/>
+              </a:defRPr>
+            </a:lvl2pPr>
+            <a:lvl3pPr marL="1143000" indent="-230706" algn="l" defTabSz="609570" rtl="0" eaLnBrk="1" latinLnBrk="0" hangingPunct="1">
+              <a:lnSpc>
+                <a:spcPct val="100000"/>
+              </a:lnSpc>
+              <a:spcBef>
+                <a:spcPts val="0"/>
+              </a:spcBef>
+              <a:spcAft>
+                <a:spcPts val="0"/>
+              </a:spcAft>
+              <a:buFont typeface="Arial"/>
+              <a:buChar char="•"/>
+              <a:defRPr sz="1800" kern="1200">
+                <a:solidFill>
+                  <a:schemeClr val="tx1"/>
+                </a:solidFill>
+                <a:latin typeface="Arial"/>
+                <a:ea typeface="Arial" panose="020B0604020202020204" pitchFamily="34" charset="0"/>
+                <a:cs typeface="Arial"/>
+              </a:defRPr>
+            </a:lvl3pPr>
+            <a:lvl4pPr marL="1600200" indent="-224356" algn="l" defTabSz="609570" rtl="0" eaLnBrk="1" latinLnBrk="0" hangingPunct="1">
+              <a:lnSpc>
+                <a:spcPct val="100000"/>
+              </a:lnSpc>
+              <a:spcBef>
+                <a:spcPts val="0"/>
+              </a:spcBef>
+              <a:spcAft>
+                <a:spcPts val="0"/>
+              </a:spcAft>
+              <a:buFont typeface="Arial"/>
+              <a:buChar char="–"/>
+              <a:defRPr sz="1800" kern="1200">
+                <a:solidFill>
+                  <a:schemeClr val="tx1"/>
+                </a:solidFill>
+                <a:latin typeface="Arial"/>
+                <a:ea typeface="Arial" panose="020B0604020202020204" pitchFamily="34" charset="0"/>
+                <a:cs typeface="Arial"/>
+              </a:defRPr>
+            </a:lvl4pPr>
+            <a:lvl5pPr marL="2057400" indent="-230706" algn="l" defTabSz="609570" rtl="0" eaLnBrk="1" latinLnBrk="0" hangingPunct="1">
+              <a:lnSpc>
+                <a:spcPct val="100000"/>
+              </a:lnSpc>
+              <a:spcBef>
+                <a:spcPts val="0"/>
+              </a:spcBef>
+              <a:spcAft>
+                <a:spcPts val="0"/>
+              </a:spcAft>
+              <a:buFont typeface="Arial"/>
+              <a:buChar char="»"/>
+              <a:defRPr sz="1800" kern="1200">
+                <a:solidFill>
+                  <a:schemeClr val="tx1"/>
+                </a:solidFill>
+                <a:latin typeface="Arial"/>
+                <a:ea typeface="Arial" panose="020B0604020202020204" pitchFamily="34" charset="0"/>
+                <a:cs typeface="Arial"/>
+              </a:defRPr>
+            </a:lvl5pPr>
+            <a:lvl6pPr marL="3352632" indent="-304784" algn="l" defTabSz="609570" rtl="0" eaLnBrk="1" latinLnBrk="0" hangingPunct="1">
+              <a:spcBef>
+                <a:spcPct val="20000"/>
+              </a:spcBef>
+              <a:buFont typeface="Arial"/>
+              <a:buChar char="•"/>
+              <a:defRPr sz="2700" kern="1200">
+                <a:solidFill>
+                  <a:schemeClr val="tx1"/>
+                </a:solidFill>
+                <a:latin typeface="+mn-lt"/>
+                <a:ea typeface="+mn-ea"/>
+                <a:cs typeface="+mn-cs"/>
+              </a:defRPr>
+            </a:lvl6pPr>
+            <a:lvl7pPr marL="3962202" indent="-304784" algn="l" defTabSz="609570" rtl="0" eaLnBrk="1" latinLnBrk="0" hangingPunct="1">
+              <a:spcBef>
+                <a:spcPct val="20000"/>
+              </a:spcBef>
+              <a:buFont typeface="Arial"/>
+              <a:buChar char="•"/>
+              <a:defRPr sz="2700" kern="1200">
+                <a:solidFill>
+                  <a:schemeClr val="tx1"/>
+                </a:solidFill>
+                <a:latin typeface="+mn-lt"/>
+                <a:ea typeface="+mn-ea"/>
+                <a:cs typeface="+mn-cs"/>
+              </a:defRPr>
+            </a:lvl7pPr>
+            <a:lvl8pPr marL="4571772" indent="-304784" algn="l" defTabSz="609570" rtl="0" eaLnBrk="1" latinLnBrk="0" hangingPunct="1">
+              <a:spcBef>
+                <a:spcPct val="20000"/>
+              </a:spcBef>
+              <a:buFont typeface="Arial"/>
+              <a:buChar char="•"/>
+              <a:defRPr sz="2700" kern="1200">
+                <a:solidFill>
+                  <a:schemeClr val="tx1"/>
+                </a:solidFill>
+                <a:latin typeface="+mn-lt"/>
+                <a:ea typeface="+mn-ea"/>
+                <a:cs typeface="+mn-cs"/>
+              </a:defRPr>
+            </a:lvl8pPr>
+            <a:lvl9pPr marL="5181341" indent="-304784" algn="l" defTabSz="609570" rtl="0" eaLnBrk="1" latinLnBrk="0" hangingPunct="1">
+              <a:spcBef>
+                <a:spcPct val="20000"/>
+              </a:spcBef>
+              <a:buFont typeface="Arial"/>
+              <a:buChar char="•"/>
+              <a:defRPr sz="2700" kern="1200">
+                <a:solidFill>
+                  <a:schemeClr val="tx1"/>
+                </a:solidFill>
+                <a:latin typeface="+mn-lt"/>
+                <a:ea typeface="+mn-ea"/>
+                <a:cs typeface="+mn-cs"/>
+              </a:defRPr>
+            </a:lvl9pPr>
+          </a:lstStyle>
+          <a:p>
+            <a:pPr marL="0" indent="0" fontAlgn="auto">
+              <a:buFont typeface="Arial"/>
+              <a:buNone/>
+            </a:pPr>
+            <a:r>
+              <a:rPr lang="en-CA">
+                <a:latin typeface="+mj-lt"/>
+              </a:rPr>
+              <a:t>Source Orbit</a:t>
+            </a:r>
+            <a:endParaRPr lang="en-CA" dirty="0">
+              <a:latin typeface="+mj-lt"/>
+            </a:endParaRPr>
+          </a:p>
+        </p:txBody>
+      </p:sp>
+      <p:pic>
+        <p:nvPicPr>
+          <p:cNvPr id="4" name="Picture 3">
+            <a:extLst>
+              <a:ext uri="{FF2B5EF4-FFF2-40B4-BE49-F238E27FC236}">
+                <a16:creationId xmlns:a16="http://schemas.microsoft.com/office/drawing/2014/main" id="{3B00DEAD-96FE-4341-919B-37B4EC942118}"/>
+              </a:ext>
+            </a:extLst>
+          </p:cNvPr>
+          <p:cNvPicPr>
+            <a:picLocks noChangeAspect="1"/>
+          </p:cNvPicPr>
+          <p:nvPr/>
+        </p:nvPicPr>
+        <p:blipFill>
+          <a:blip r:embed="rId2"/>
+          <a:stretch>
+            <a:fillRect/>
+          </a:stretch>
+        </p:blipFill>
+        <p:spPr>
+          <a:xfrm>
+            <a:off x="7870058" y="1621406"/>
+            <a:ext cx="3820269" cy="4838497"/>
+          </a:xfrm>
+          <a:prstGeom prst="rect">
+            <a:avLst/>
+          </a:prstGeom>
+          <a:effectLst>
+            <a:outerShdw blurRad="63500" sx="102000" sy="102000" algn="ctr" rotWithShape="0">
+              <a:prstClr val="black">
+                <a:alpha val="40000"/>
+              </a:prstClr>
+            </a:outerShdw>
+          </a:effectLst>
+        </p:spPr>
+      </p:pic>
+      <p:pic>
+        <p:nvPicPr>
+          <p:cNvPr id="7" name="Picture 6" descr="A blue circle with black lines and a black circle with a black line around it&#10;&#10;Description automatically generated">
+            <a:extLst>
+              <a:ext uri="{FF2B5EF4-FFF2-40B4-BE49-F238E27FC236}">
+                <a16:creationId xmlns:a16="http://schemas.microsoft.com/office/drawing/2014/main" id="{E7BB5FA3-E0AF-9BEA-0D68-4B3A33F18016}"/>
+              </a:ext>
+            </a:extLst>
+          </p:cNvPr>
+          <p:cNvPicPr>
+            <a:picLocks noChangeAspect="1"/>
+          </p:cNvPicPr>
+          <p:nvPr/>
+        </p:nvPicPr>
+        <p:blipFill>
+          <a:blip r:embed="rId3" cstate="print">
+            <a:extLst>
+              <a:ext uri="{28A0092B-C50C-407E-A947-70E740481C1C}">
+                <a14:useLocalDpi xmlns:a14="http://schemas.microsoft.com/office/drawing/2010/main" val="0"/>
+              </a:ext>
+            </a:extLst>
+          </a:blip>
+          <a:stretch>
+            <a:fillRect/>
+          </a:stretch>
+        </p:blipFill>
+        <p:spPr>
+          <a:xfrm>
+            <a:off x="8511030" y="721406"/>
+            <a:ext cx="900000" cy="900000"/>
+          </a:xfrm>
+          <a:prstGeom prst="rect">
+            <a:avLst/>
+          </a:prstGeom>
+          <a:effectLst>
+            <a:outerShdw blurRad="50800" dist="38100" dir="2700000" algn="tl" rotWithShape="0">
+              <a:prstClr val="black">
+                <a:alpha val="40000"/>
+              </a:prstClr>
+            </a:outerShdw>
+          </a:effectLst>
+        </p:spPr>
+      </p:pic>
     </p:spTree>
     <p:extLst>
       <p:ext uri="{BB962C8B-B14F-4D97-AF65-F5344CB8AC3E}">
-        <p14:creationId xmlns:p14="http://schemas.microsoft.com/office/powerpoint/2010/main" val="3813979308"/>
+        <p14:creationId xmlns:p14="http://schemas.microsoft.com/office/powerpoint/2010/main" val="2985020322"/>
       </p:ext>
     </p:extLst>
   </p:cSld>
@@ -26163,7 +26641,7 @@
               <a:rPr lang="en-CA" b="1" dirty="0">
                 <a:latin typeface="+mj-lt"/>
               </a:rPr>
-              <a:t>CLI Usage</a:t>
+              <a:t>Impact Analysis…What Objects am I Affecting?</a:t>
             </a:r>
           </a:p>
         </p:txBody>
@@ -26201,7 +26679,7 @@
     </p:spTree>
     <p:extLst>
       <p:ext uri="{BB962C8B-B14F-4D97-AF65-F5344CB8AC3E}">
-        <p14:creationId xmlns:p14="http://schemas.microsoft.com/office/powerpoint/2010/main" val="2195608619"/>
+        <p14:creationId xmlns:p14="http://schemas.microsoft.com/office/powerpoint/2010/main" val="3813979308"/>
       </p:ext>
     </p:extLst>
   </p:cSld>
@@ -26253,7 +26731,7 @@
               <a:rPr lang="en-CA" b="1" dirty="0">
                 <a:latin typeface="+mj-lt"/>
               </a:rPr>
-              <a:t>Usage in GitHub Action</a:t>
+              <a:t>Repository Cleanup</a:t>
             </a:r>
           </a:p>
         </p:txBody>
@@ -26291,7 +26769,7 @@
     </p:spTree>
     <p:extLst>
       <p:ext uri="{BB962C8B-B14F-4D97-AF65-F5344CB8AC3E}">
-        <p14:creationId xmlns:p14="http://schemas.microsoft.com/office/powerpoint/2010/main" val="3300179726"/>
+        <p14:creationId xmlns:p14="http://schemas.microsoft.com/office/powerpoint/2010/main" val="342907601"/>
       </p:ext>
     </p:extLst>
   </p:cSld>
@@ -26487,10 +26965,10 @@
       </p:grpSpPr>
       <p:sp>
         <p:nvSpPr>
-          <p:cNvPr id="6" name="Title 5">
+          <p:cNvPr id="5" name="Title 4">
             <a:extLst>
               <a:ext uri="{FF2B5EF4-FFF2-40B4-BE49-F238E27FC236}">
-                <a16:creationId xmlns:a16="http://schemas.microsoft.com/office/drawing/2014/main" id="{4ED1E0B2-0440-F85E-027D-40EBDA946C15}"/>
+                <a16:creationId xmlns:a16="http://schemas.microsoft.com/office/drawing/2014/main" id="{E164C9CA-47E7-5B76-54C2-D3CB1CA576C9}"/>
               </a:ext>
             </a:extLst>
           </p:cNvPr>
@@ -26501,35 +26979,445 @@
             <p:ph type="title"/>
           </p:nvPr>
         </p:nvSpPr>
+        <p:spPr/>
+        <p:txBody>
+          <a:bodyPr/>
+          <a:lstStyle/>
+          <a:p>
+            <a:r>
+              <a:rPr lang="en-CA" b="1" dirty="0">
+                <a:latin typeface="+mj-lt"/>
+              </a:rPr>
+              <a:t>Integrated into IBM </a:t>
+            </a:r>
+            <a:r>
+              <a:rPr lang="en-CA" b="1" dirty="0" err="1">
+                <a:latin typeface="+mj-lt"/>
+              </a:rPr>
+              <a:t>i</a:t>
+            </a:r>
+            <a:r>
+              <a:rPr lang="en-CA" b="1" dirty="0">
+                <a:latin typeface="+mj-lt"/>
+              </a:rPr>
+              <a:t> Project Explorer</a:t>
+            </a:r>
+          </a:p>
+        </p:txBody>
+      </p:sp>
+      <p:sp>
+        <p:nvSpPr>
+          <p:cNvPr id="6" name="Text Placeholder 5">
+            <a:extLst>
+              <a:ext uri="{FF2B5EF4-FFF2-40B4-BE49-F238E27FC236}">
+                <a16:creationId xmlns:a16="http://schemas.microsoft.com/office/drawing/2014/main" id="{92CCBB2A-9653-B3A8-B8CF-E55B1670D895}"/>
+              </a:ext>
+            </a:extLst>
+          </p:cNvPr>
+          <p:cNvSpPr>
+            <a:spLocks noGrp="1"/>
+          </p:cNvSpPr>
+          <p:nvPr>
+            <p:ph type="body" sz="quarter" idx="15"/>
+          </p:nvPr>
+        </p:nvSpPr>
         <p:spPr>
           <a:xfrm>
-            <a:off x="990600" y="3207757"/>
-            <a:ext cx="10210800" cy="442486"/>
+            <a:off x="1566863" y="1304924"/>
+            <a:ext cx="2733675" cy="4540725"/>
           </a:xfrm>
         </p:spPr>
         <p:txBody>
-          <a:bodyPr>
+          <a:bodyPr anchor="ctr"/>
+          <a:lstStyle/>
+          <a:p>
+            <a:pPr marL="0" indent="0" algn="ctr">
+              <a:buNone/>
+            </a:pPr>
+            <a:r>
+              <a:rPr lang="en-US" dirty="0">
+                <a:latin typeface="+mj-lt"/>
+              </a:rPr>
+              <a:t>QSYS members in source physical files</a:t>
+            </a:r>
+          </a:p>
+          <a:p>
+            <a:pPr marL="0" indent="0" algn="ctr">
+              <a:buNone/>
+            </a:pPr>
+            <a:r>
+              <a:rPr lang="en-US" dirty="0">
+                <a:latin typeface="+mj-lt"/>
+              </a:rPr>
+              <a:t>↓</a:t>
+            </a:r>
+          </a:p>
+          <a:p>
+            <a:pPr marL="0" indent="0" algn="ctr">
+              <a:buNone/>
+            </a:pPr>
+            <a:r>
+              <a:rPr lang="en-US" dirty="0">
+                <a:latin typeface="+mj-lt"/>
+              </a:rPr>
+              <a:t>Properly encoded, terminated, and named source files in an IFS directory</a:t>
+            </a:r>
+          </a:p>
+          <a:p>
+            <a:pPr marL="0" indent="0" algn="ctr">
+              <a:buNone/>
+            </a:pPr>
+            <a:r>
+              <a:rPr lang="en-US" dirty="0">
+                <a:latin typeface="+mj-lt"/>
+              </a:rPr>
+              <a:t>↓</a:t>
+            </a:r>
+          </a:p>
+          <a:p>
+            <a:pPr marL="0" indent="0" algn="ctr">
+              <a:buNone/>
+            </a:pPr>
+            <a:r>
+              <a:rPr lang="en-US" dirty="0">
+                <a:latin typeface="+mj-lt"/>
+              </a:rPr>
+              <a:t>Download to local project</a:t>
+            </a:r>
+          </a:p>
+          <a:p>
+            <a:pPr marL="0" indent="0" algn="ctr">
+              <a:buNone/>
+            </a:pPr>
+            <a:r>
+              <a:rPr lang="en-US" dirty="0">
+                <a:latin typeface="+mj-lt"/>
+              </a:rPr>
+              <a:t>↓</a:t>
+            </a:r>
+          </a:p>
+          <a:p>
+            <a:pPr marL="0" indent="0" algn="ctr">
+              <a:buNone/>
+            </a:pPr>
+            <a:r>
+              <a:rPr lang="en-US" dirty="0">
+                <a:latin typeface="+mj-lt"/>
+              </a:rPr>
+              <a:t>Rename extensions</a:t>
+            </a:r>
+          </a:p>
+          <a:p>
+            <a:pPr marL="0" indent="0" algn="ctr">
+              <a:buNone/>
+            </a:pPr>
+            <a:r>
+              <a:rPr lang="en-US" dirty="0">
+                <a:latin typeface="+mj-lt"/>
+              </a:rPr>
+              <a:t>↓</a:t>
+            </a:r>
+          </a:p>
+          <a:p>
+            <a:pPr marL="0" indent="0" algn="ctr">
+              <a:buNone/>
+            </a:pPr>
+            <a:r>
+              <a:rPr lang="en-US" dirty="0">
+                <a:latin typeface="+mj-lt"/>
+              </a:rPr>
+              <a:t>Convert includes/copy directives to Unix style paths</a:t>
+            </a:r>
+          </a:p>
+        </p:txBody>
+      </p:sp>
+      <p:pic>
+        <p:nvPicPr>
+          <p:cNvPr id="7" name="Picture 6">
+            <a:extLst>
+              <a:ext uri="{FF2B5EF4-FFF2-40B4-BE49-F238E27FC236}">
+                <a16:creationId xmlns:a16="http://schemas.microsoft.com/office/drawing/2014/main" id="{160F8A9A-29C4-BEF9-7042-D3EE18E7C5D7}"/>
+              </a:ext>
+            </a:extLst>
+          </p:cNvPr>
+          <p:cNvPicPr>
+            <a:picLocks noChangeAspect="1"/>
+          </p:cNvPicPr>
+          <p:nvPr/>
+        </p:nvPicPr>
+        <p:blipFill>
+          <a:blip r:embed="rId2"/>
+          <a:stretch>
+            <a:fillRect/>
+          </a:stretch>
+        </p:blipFill>
+        <p:spPr>
+          <a:xfrm>
+            <a:off x="4438649" y="1304924"/>
+            <a:ext cx="7413879" cy="4540725"/>
+          </a:xfrm>
+          <a:prstGeom prst="rect">
+            <a:avLst/>
+          </a:prstGeom>
+          <a:effectLst>
+            <a:outerShdw blurRad="63500" sx="102000" sy="102000" algn="ctr" rotWithShape="0">
+              <a:prstClr val="black">
+                <a:alpha val="40000"/>
+              </a:prstClr>
+            </a:outerShdw>
+          </a:effectLst>
+        </p:spPr>
+      </p:pic>
+      <p:sp>
+        <p:nvSpPr>
+          <p:cNvPr id="12" name="TextBox 11">
+            <a:extLst>
+              <a:ext uri="{FF2B5EF4-FFF2-40B4-BE49-F238E27FC236}">
+                <a16:creationId xmlns:a16="http://schemas.microsoft.com/office/drawing/2014/main" id="{D28A5747-5A99-A5C3-F007-1263C614A9D8}"/>
+              </a:ext>
+            </a:extLst>
+          </p:cNvPr>
+          <p:cNvSpPr txBox="1"/>
+          <p:nvPr/>
+        </p:nvSpPr>
+        <p:spPr>
+          <a:xfrm>
+            <a:off x="115489" y="1698531"/>
+            <a:ext cx="1581151" cy="646331"/>
+          </a:xfrm>
+          <a:prstGeom prst="rect">
+            <a:avLst/>
+          </a:prstGeom>
+          <a:noFill/>
+        </p:spPr>
+        <p:txBody>
+          <a:bodyPr wrap="square">
+            <a:spAutoFit/>
+          </a:bodyPr>
+          <a:lstStyle/>
+          <a:p>
+            <a:pPr marL="0" indent="0" algn="ctr">
+              <a:buNone/>
+            </a:pPr>
+            <a:r>
+              <a:rPr lang="en-CA" dirty="0">
+                <a:solidFill>
+                  <a:srgbClr val="00B050"/>
+                </a:solidFill>
+                <a:latin typeface="+mj-lt"/>
+              </a:rPr>
+              <a:t>CVTSRCPF from BOB</a:t>
+            </a:r>
+          </a:p>
+        </p:txBody>
+      </p:sp>
+      <p:sp>
+        <p:nvSpPr>
+          <p:cNvPr id="13" name="TextBox 12">
+            <a:extLst>
+              <a:ext uri="{FF2B5EF4-FFF2-40B4-BE49-F238E27FC236}">
+                <a16:creationId xmlns:a16="http://schemas.microsoft.com/office/drawing/2014/main" id="{463D14F9-10FE-6C38-6E55-CE72DC70011F}"/>
+              </a:ext>
+            </a:extLst>
+          </p:cNvPr>
+          <p:cNvSpPr txBox="1"/>
+          <p:nvPr/>
+        </p:nvSpPr>
+        <p:spPr>
+          <a:xfrm>
+            <a:off x="115489" y="4532759"/>
+            <a:ext cx="1581151" cy="369332"/>
+          </a:xfrm>
+          <a:prstGeom prst="rect">
+            <a:avLst/>
+          </a:prstGeom>
+          <a:noFill/>
+        </p:spPr>
+        <p:txBody>
+          <a:bodyPr wrap="square">
+            <a:spAutoFit/>
+          </a:bodyPr>
+          <a:lstStyle/>
+          <a:p>
+            <a:pPr marL="0" indent="0" algn="ctr">
+              <a:buNone/>
+            </a:pPr>
+            <a:r>
+              <a:rPr lang="en-CA" dirty="0">
+                <a:solidFill>
+                  <a:srgbClr val="1670FF"/>
+                </a:solidFill>
+                <a:latin typeface="+mj-lt"/>
+              </a:rPr>
+              <a:t>Source Orbit</a:t>
+            </a:r>
+          </a:p>
+        </p:txBody>
+      </p:sp>
+      <p:sp>
+        <p:nvSpPr>
+          <p:cNvPr id="16" name="Rectangle 15">
+            <a:extLst>
+              <a:ext uri="{FF2B5EF4-FFF2-40B4-BE49-F238E27FC236}">
+                <a16:creationId xmlns:a16="http://schemas.microsoft.com/office/drawing/2014/main" id="{56FF5FED-E884-5419-09E5-F2C73439E589}"/>
+              </a:ext>
+            </a:extLst>
+          </p:cNvPr>
+          <p:cNvSpPr/>
+          <p:nvPr/>
+        </p:nvSpPr>
+        <p:spPr>
+          <a:xfrm>
+            <a:off x="1697830" y="1366521"/>
+            <a:ext cx="2474120" cy="1948180"/>
+          </a:xfrm>
+          <a:prstGeom prst="rect">
+            <a:avLst/>
+          </a:prstGeom>
+          <a:ln w="15875">
+            <a:solidFill>
+              <a:srgbClr val="00B050"/>
+            </a:solidFill>
+          </a:ln>
+        </p:spPr>
+        <p:txBody>
+          <a:bodyPr wrap="square" lIns="0" tIns="0" rIns="0" bIns="0" rtlCol="0" anchor="ctr">
             <a:noAutofit/>
           </a:bodyPr>
           <a:lstStyle/>
           <a:p>
             <a:pPr algn="ctr"/>
-            <a:r>
-              <a:rPr lang="en-US" sz="4500" b="1" dirty="0">
-                <a:latin typeface="+mj-lt"/>
-              </a:rPr>
-              <a:t>Demo</a:t>
-            </a:r>
-            <a:endParaRPr lang="en-CA" sz="4500" b="1" dirty="0">
-              <a:latin typeface="+mj-lt"/>
+            <a:endParaRPr lang="en-CA" sz="1200" dirty="0">
+              <a:solidFill>
+                <a:schemeClr val="tx2">
+                  <a:lumMod val="50000"/>
+                </a:schemeClr>
+              </a:solidFill>
+              <a:latin typeface="Arial"/>
+              <a:cs typeface="Arial"/>
             </a:endParaRPr>
           </a:p>
         </p:txBody>
       </p:sp>
+      <p:sp>
+        <p:nvSpPr>
+          <p:cNvPr id="17" name="Rectangle 16">
+            <a:extLst>
+              <a:ext uri="{FF2B5EF4-FFF2-40B4-BE49-F238E27FC236}">
+                <a16:creationId xmlns:a16="http://schemas.microsoft.com/office/drawing/2014/main" id="{22FFF1E6-0B80-31AF-DBB0-75F3BE407AED}"/>
+              </a:ext>
+            </a:extLst>
+          </p:cNvPr>
+          <p:cNvSpPr/>
+          <p:nvPr/>
+        </p:nvSpPr>
+        <p:spPr>
+          <a:xfrm>
+            <a:off x="1696640" y="4389120"/>
+            <a:ext cx="2474120" cy="1410779"/>
+          </a:xfrm>
+          <a:prstGeom prst="rect">
+            <a:avLst/>
+          </a:prstGeom>
+          <a:ln w="15875">
+            <a:solidFill>
+              <a:srgbClr val="1670FF"/>
+            </a:solidFill>
+          </a:ln>
+        </p:spPr>
+        <p:txBody>
+          <a:bodyPr wrap="square" lIns="0" tIns="0" rIns="0" bIns="0" rtlCol="0" anchor="ctr">
+            <a:noAutofit/>
+          </a:bodyPr>
+          <a:lstStyle/>
+          <a:p>
+            <a:pPr algn="ctr"/>
+            <a:endParaRPr lang="en-CA" sz="1200" dirty="0">
+              <a:solidFill>
+                <a:srgbClr val="FF0000"/>
+              </a:solidFill>
+              <a:latin typeface="Arial"/>
+              <a:cs typeface="Arial"/>
+            </a:endParaRPr>
+          </a:p>
+        </p:txBody>
+      </p:sp>
+      <p:pic>
+        <p:nvPicPr>
+          <p:cNvPr id="25" name="Picture 24" descr="A blue circle with black lines and a black circle with a black line around it&#10;&#10;Description automatically generated">
+            <a:extLst>
+              <a:ext uri="{FF2B5EF4-FFF2-40B4-BE49-F238E27FC236}">
+                <a16:creationId xmlns:a16="http://schemas.microsoft.com/office/drawing/2014/main" id="{CEEB719A-381D-5EC3-D8E2-DF4F56D97AE3}"/>
+              </a:ext>
+            </a:extLst>
+          </p:cNvPr>
+          <p:cNvPicPr>
+            <a:picLocks noChangeAspect="1"/>
+          </p:cNvPicPr>
+          <p:nvPr/>
+        </p:nvPicPr>
+        <p:blipFill>
+          <a:blip r:embed="rId3" cstate="print">
+            <a:extLst>
+              <a:ext uri="{28A0092B-C50C-407E-A947-70E740481C1C}">
+                <a14:useLocalDpi xmlns:a14="http://schemas.microsoft.com/office/drawing/2010/main" val="0"/>
+              </a:ext>
+            </a:extLst>
+          </a:blip>
+          <a:stretch>
+            <a:fillRect/>
+          </a:stretch>
+        </p:blipFill>
+        <p:spPr>
+          <a:xfrm>
+            <a:off x="456064" y="4902091"/>
+            <a:ext cx="900000" cy="900000"/>
+          </a:xfrm>
+          <a:prstGeom prst="rect">
+            <a:avLst/>
+          </a:prstGeom>
+        </p:spPr>
+      </p:pic>
+      <p:pic>
+        <p:nvPicPr>
+          <p:cNvPr id="19" name="Picture 18">
+            <a:extLst>
+              <a:ext uri="{FF2B5EF4-FFF2-40B4-BE49-F238E27FC236}">
+                <a16:creationId xmlns:a16="http://schemas.microsoft.com/office/drawing/2014/main" id="{0298A7A9-F310-4DEE-D51D-BA49E651765D}"/>
+              </a:ext>
+            </a:extLst>
+          </p:cNvPr>
+          <p:cNvPicPr>
+            <a:picLocks noChangeAspect="1"/>
+          </p:cNvPicPr>
+          <p:nvPr/>
+        </p:nvPicPr>
+        <p:blipFill>
+          <a:blip r:embed="rId4">
+            <a:extLst>
+              <a:ext uri="{28A0092B-C50C-407E-A947-70E740481C1C}">
+                <a14:useLocalDpi xmlns:a14="http://schemas.microsoft.com/office/drawing/2010/main" val="0"/>
+              </a:ext>
+            </a:extLst>
+          </a:blip>
+          <a:stretch>
+            <a:fillRect/>
+          </a:stretch>
+        </p:blipFill>
+        <p:spPr>
+          <a:xfrm>
+            <a:off x="528064" y="2346043"/>
+            <a:ext cx="756000" cy="756000"/>
+          </a:xfrm>
+          <a:prstGeom prst="rect">
+            <a:avLst/>
+          </a:prstGeom>
+        </p:spPr>
+      </p:pic>
     </p:spTree>
     <p:extLst>
       <p:ext uri="{BB962C8B-B14F-4D97-AF65-F5344CB8AC3E}">
-        <p14:creationId xmlns:p14="http://schemas.microsoft.com/office/powerpoint/2010/main" val="1262734400"/>
+        <p14:creationId xmlns:p14="http://schemas.microsoft.com/office/powerpoint/2010/main" val="2390328998"/>
       </p:ext>
     </p:extLst>
   </p:cSld>
@@ -26556,10 +27444,70 @@
           <a:chExt cx="0" cy="0"/>
         </a:xfrm>
       </p:grpSpPr>
+      <p:sp>
+        <p:nvSpPr>
+          <p:cNvPr id="5" name="Title 4">
+            <a:extLst>
+              <a:ext uri="{FF2B5EF4-FFF2-40B4-BE49-F238E27FC236}">
+                <a16:creationId xmlns:a16="http://schemas.microsoft.com/office/drawing/2014/main" id="{E164C9CA-47E7-5B76-54C2-D3CB1CA576C9}"/>
+              </a:ext>
+            </a:extLst>
+          </p:cNvPr>
+          <p:cNvSpPr>
+            <a:spLocks noGrp="1"/>
+          </p:cNvSpPr>
+          <p:nvPr>
+            <p:ph type="title"/>
+          </p:nvPr>
+        </p:nvSpPr>
+        <p:spPr/>
+        <p:txBody>
+          <a:bodyPr/>
+          <a:lstStyle/>
+          <a:p>
+            <a:r>
+              <a:rPr lang="en-CA" b="1" dirty="0">
+                <a:latin typeface="+mj-lt"/>
+              </a:rPr>
+              <a:t>CLI Usage</a:t>
+            </a:r>
+          </a:p>
+        </p:txBody>
+      </p:sp>
+      <p:sp>
+        <p:nvSpPr>
+          <p:cNvPr id="6" name="Text Placeholder 5">
+            <a:extLst>
+              <a:ext uri="{FF2B5EF4-FFF2-40B4-BE49-F238E27FC236}">
+                <a16:creationId xmlns:a16="http://schemas.microsoft.com/office/drawing/2014/main" id="{92CCBB2A-9653-B3A8-B8CF-E55B1670D895}"/>
+              </a:ext>
+            </a:extLst>
+          </p:cNvPr>
+          <p:cNvSpPr>
+            <a:spLocks noGrp="1"/>
+          </p:cNvSpPr>
+          <p:nvPr>
+            <p:ph type="body" sz="quarter" idx="15"/>
+          </p:nvPr>
+        </p:nvSpPr>
+        <p:spPr/>
+        <p:txBody>
+          <a:bodyPr/>
+          <a:lstStyle/>
+          <a:p>
+            <a:r>
+              <a:rPr lang="en-CA" dirty="0">
+                <a:latin typeface="+mj-lt"/>
+              </a:rPr>
+              <a:t>WIP</a:t>
+            </a:r>
+          </a:p>
+        </p:txBody>
+      </p:sp>
     </p:spTree>
     <p:extLst>
       <p:ext uri="{BB962C8B-B14F-4D97-AF65-F5344CB8AC3E}">
-        <p14:creationId xmlns:p14="http://schemas.microsoft.com/office/powerpoint/2010/main" val="1643754911"/>
+        <p14:creationId xmlns:p14="http://schemas.microsoft.com/office/powerpoint/2010/main" val="2195608619"/>
       </p:ext>
     </p:extLst>
   </p:cSld>
@@ -26611,7 +27559,168 @@
               <a:rPr lang="en-CA" b="1" dirty="0">
                 <a:latin typeface="+mj-lt"/>
               </a:rPr>
-              <a:t>Links</a:t>
+              <a:t>Usage in GitHub Action</a:t>
+            </a:r>
+          </a:p>
+        </p:txBody>
+      </p:sp>
+      <p:sp>
+        <p:nvSpPr>
+          <p:cNvPr id="6" name="Text Placeholder 5">
+            <a:extLst>
+              <a:ext uri="{FF2B5EF4-FFF2-40B4-BE49-F238E27FC236}">
+                <a16:creationId xmlns:a16="http://schemas.microsoft.com/office/drawing/2014/main" id="{92CCBB2A-9653-B3A8-B8CF-E55B1670D895}"/>
+              </a:ext>
+            </a:extLst>
+          </p:cNvPr>
+          <p:cNvSpPr>
+            <a:spLocks noGrp="1"/>
+          </p:cNvSpPr>
+          <p:nvPr>
+            <p:ph type="body" sz="quarter" idx="15"/>
+          </p:nvPr>
+        </p:nvSpPr>
+        <p:spPr/>
+        <p:txBody>
+          <a:bodyPr/>
+          <a:lstStyle/>
+          <a:p>
+            <a:r>
+              <a:rPr lang="en-CA" dirty="0">
+                <a:latin typeface="+mj-lt"/>
+              </a:rPr>
+              <a:t>WIP</a:t>
+            </a:r>
+          </a:p>
+        </p:txBody>
+      </p:sp>
+    </p:spTree>
+    <p:extLst>
+      <p:ext uri="{BB962C8B-B14F-4D97-AF65-F5344CB8AC3E}">
+        <p14:creationId xmlns:p14="http://schemas.microsoft.com/office/powerpoint/2010/main" val="3300179726"/>
+      </p:ext>
+    </p:extLst>
+  </p:cSld>
+  <p:clrMapOvr>
+    <a:masterClrMapping/>
+  </p:clrMapOvr>
+</p:sld>
+</file>
+
+<file path=ppt/slides/slide23.xml><?xml version="1.0" encoding="utf-8"?>
+<p:sld xmlns:a="http://schemas.openxmlformats.org/drawingml/2006/main" xmlns:r="http://schemas.openxmlformats.org/officeDocument/2006/relationships" xmlns:p="http://schemas.openxmlformats.org/presentationml/2006/main">
+  <p:cSld>
+    <p:spTree>
+      <p:nvGrpSpPr>
+        <p:cNvPr id="1" name=""/>
+        <p:cNvGrpSpPr/>
+        <p:nvPr/>
+      </p:nvGrpSpPr>
+      <p:grpSpPr>
+        <a:xfrm>
+          <a:off x="0" y="0"/>
+          <a:ext cx="0" cy="0"/>
+          <a:chOff x="0" y="0"/>
+          <a:chExt cx="0" cy="0"/>
+        </a:xfrm>
+      </p:grpSpPr>
+      <p:sp>
+        <p:nvSpPr>
+          <p:cNvPr id="6" name="Title 5">
+            <a:extLst>
+              <a:ext uri="{FF2B5EF4-FFF2-40B4-BE49-F238E27FC236}">
+                <a16:creationId xmlns:a16="http://schemas.microsoft.com/office/drawing/2014/main" id="{4ED1E0B2-0440-F85E-027D-40EBDA946C15}"/>
+              </a:ext>
+            </a:extLst>
+          </p:cNvPr>
+          <p:cNvSpPr>
+            <a:spLocks noGrp="1"/>
+          </p:cNvSpPr>
+          <p:nvPr>
+            <p:ph type="title"/>
+          </p:nvPr>
+        </p:nvSpPr>
+        <p:spPr>
+          <a:xfrm>
+            <a:off x="990600" y="3207757"/>
+            <a:ext cx="10210800" cy="442486"/>
+          </a:xfrm>
+        </p:spPr>
+        <p:txBody>
+          <a:bodyPr>
+            <a:noAutofit/>
+          </a:bodyPr>
+          <a:lstStyle/>
+          <a:p>
+            <a:pPr algn="ctr"/>
+            <a:r>
+              <a:rPr lang="en-US" sz="4500" b="1" dirty="0">
+                <a:latin typeface="+mj-lt"/>
+              </a:rPr>
+              <a:t>Demo</a:t>
+            </a:r>
+            <a:endParaRPr lang="en-CA" sz="4500" b="1" dirty="0">
+              <a:latin typeface="+mj-lt"/>
+            </a:endParaRPr>
+          </a:p>
+        </p:txBody>
+      </p:sp>
+    </p:spTree>
+    <p:extLst>
+      <p:ext uri="{BB962C8B-B14F-4D97-AF65-F5344CB8AC3E}">
+        <p14:creationId xmlns:p14="http://schemas.microsoft.com/office/powerpoint/2010/main" val="1262734400"/>
+      </p:ext>
+    </p:extLst>
+  </p:cSld>
+  <p:clrMapOvr>
+    <a:masterClrMapping/>
+  </p:clrMapOvr>
+</p:sld>
+</file>
+
+<file path=ppt/slides/slide24.xml><?xml version="1.0" encoding="utf-8"?>
+<p:sld xmlns:a="http://schemas.openxmlformats.org/drawingml/2006/main" xmlns:r="http://schemas.openxmlformats.org/officeDocument/2006/relationships" xmlns:p="http://schemas.openxmlformats.org/presentationml/2006/main">
+  <p:cSld>
+    <p:spTree>
+      <p:nvGrpSpPr>
+        <p:cNvPr id="1" name=""/>
+        <p:cNvGrpSpPr/>
+        <p:nvPr/>
+      </p:nvGrpSpPr>
+      <p:grpSpPr>
+        <a:xfrm>
+          <a:off x="0" y="0"/>
+          <a:ext cx="0" cy="0"/>
+          <a:chOff x="0" y="0"/>
+          <a:chExt cx="0" cy="0"/>
+        </a:xfrm>
+      </p:grpSpPr>
+      <p:sp>
+        <p:nvSpPr>
+          <p:cNvPr id="5" name="Title 4">
+            <a:extLst>
+              <a:ext uri="{FF2B5EF4-FFF2-40B4-BE49-F238E27FC236}">
+                <a16:creationId xmlns:a16="http://schemas.microsoft.com/office/drawing/2014/main" id="{E164C9CA-47E7-5B76-54C2-D3CB1CA576C9}"/>
+              </a:ext>
+            </a:extLst>
+          </p:cNvPr>
+          <p:cNvSpPr>
+            <a:spLocks noGrp="1"/>
+          </p:cNvSpPr>
+          <p:nvPr>
+            <p:ph type="title"/>
+          </p:nvPr>
+        </p:nvSpPr>
+        <p:spPr/>
+        <p:txBody>
+          <a:bodyPr/>
+          <a:lstStyle/>
+          <a:p>
+            <a:r>
+              <a:rPr lang="en-CA" b="1" dirty="0">
+                <a:latin typeface="+mj-lt"/>
+              </a:rPr>
+              <a:t>Important Links</a:t>
             </a:r>
           </a:p>
         </p:txBody>
@@ -26762,6 +27871,2232 @@
     <p:extLst>
       <p:ext uri="{BB962C8B-B14F-4D97-AF65-F5344CB8AC3E}">
         <p14:creationId xmlns:p14="http://schemas.microsoft.com/office/powerpoint/2010/main" val="1214461386"/>
+      </p:ext>
+    </p:extLst>
+  </p:cSld>
+  <p:clrMapOvr>
+    <a:masterClrMapping/>
+  </p:clrMapOvr>
+</p:sld>
+</file>
+
+<file path=ppt/slides/slide25.xml><?xml version="1.0" encoding="utf-8"?>
+<p:sld xmlns:a="http://schemas.openxmlformats.org/drawingml/2006/main" xmlns:r="http://schemas.openxmlformats.org/officeDocument/2006/relationships" xmlns:p="http://schemas.openxmlformats.org/presentationml/2006/main">
+  <p:cSld>
+    <p:spTree>
+      <p:nvGrpSpPr>
+        <p:cNvPr id="1" name=""/>
+        <p:cNvGrpSpPr/>
+        <p:nvPr/>
+      </p:nvGrpSpPr>
+      <p:grpSpPr>
+        <a:xfrm>
+          <a:off x="0" y="0"/>
+          <a:ext cx="0" cy="0"/>
+          <a:chOff x="0" y="0"/>
+          <a:chExt cx="0" cy="0"/>
+        </a:xfrm>
+      </p:grpSpPr>
+      <p:sp>
+        <p:nvSpPr>
+          <p:cNvPr id="2" name="Title 1"/>
+          <p:cNvSpPr>
+            <a:spLocks noGrp="1"/>
+          </p:cNvSpPr>
+          <p:nvPr>
+            <p:ph type="title"/>
+          </p:nvPr>
+        </p:nvSpPr>
+        <p:spPr>
+          <a:xfrm>
+            <a:off x="308812" y="221657"/>
+            <a:ext cx="10210800" cy="442486"/>
+          </a:xfrm>
+        </p:spPr>
+        <p:txBody>
+          <a:bodyPr>
+            <a:normAutofit fontScale="90000"/>
+          </a:bodyPr>
+          <a:lstStyle/>
+          <a:p>
+            <a:pPr>
+              <a:defRPr/>
+            </a:pPr>
+            <a:r>
+              <a:rPr lang="en-US" b="1" dirty="0">
+                <a:latin typeface="+mj-lt"/>
+              </a:rPr>
+              <a:t>For More Information</a:t>
+            </a:r>
+          </a:p>
+        </p:txBody>
+      </p:sp>
+      <p:sp>
+        <p:nvSpPr>
+          <p:cNvPr id="3" name="Slide Number Placeholder 2"/>
+          <p:cNvSpPr>
+            <a:spLocks noGrp="1"/>
+          </p:cNvSpPr>
+          <p:nvPr>
+            <p:ph type="sldNum" sz="quarter" idx="10"/>
+          </p:nvPr>
+        </p:nvSpPr>
+        <p:spPr/>
+        <p:txBody>
+          <a:bodyPr/>
+          <a:lstStyle/>
+          <a:p>
+            <a:pPr defTabSz="914377"/>
+            <a:fld id="{C86DB6BA-D2A3-0548-99DE-7EA3F6D8C650}" type="slidenum">
+              <a:rPr lang="en-US">
+                <a:solidFill>
+                  <a:srgbClr val="000000"/>
+                </a:solidFill>
+                <a:latin typeface="Arial" panose="020B0604020202020204" pitchFamily="34" charset="0"/>
+              </a:rPr>
+              <a:pPr defTabSz="914377"/>
+              <a:t>25</a:t>
+            </a:fld>
+            <a:endParaRPr lang="en-US" dirty="0">
+              <a:solidFill>
+                <a:srgbClr val="000000"/>
+              </a:solidFill>
+              <a:latin typeface="Arial" panose="020B0604020202020204" pitchFamily="34" charset="0"/>
+            </a:endParaRPr>
+          </a:p>
+        </p:txBody>
+      </p:sp>
+      <p:graphicFrame>
+        <p:nvGraphicFramePr>
+          <p:cNvPr id="4" name="Group 7"/>
+          <p:cNvGraphicFramePr>
+            <a:graphicFrameLocks noGrp="1"/>
+          </p:cNvGraphicFramePr>
+          <p:nvPr/>
+        </p:nvGraphicFramePr>
+        <p:xfrm>
+          <a:off x="386178" y="809977"/>
+          <a:ext cx="11241666" cy="5659344"/>
+        </p:xfrm>
+        <a:graphic>
+          <a:graphicData uri="http://schemas.openxmlformats.org/drawingml/2006/table">
+            <a:tbl>
+              <a:tblPr/>
+              <a:tblGrid>
+                <a:gridCol w="7335423">
+                  <a:extLst>
+                    <a:ext uri="{9D8B030D-6E8A-4147-A177-3AD203B41FA5}">
+                      <a16:colId xmlns:a16="http://schemas.microsoft.com/office/drawing/2014/main" val="20000"/>
+                    </a:ext>
+                  </a:extLst>
+                </a:gridCol>
+                <a:gridCol w="1981200">
+                  <a:extLst>
+                    <a:ext uri="{9D8B030D-6E8A-4147-A177-3AD203B41FA5}">
+                      <a16:colId xmlns:a16="http://schemas.microsoft.com/office/drawing/2014/main" val="20001"/>
+                    </a:ext>
+                  </a:extLst>
+                </a:gridCol>
+                <a:gridCol w="1925043">
+                  <a:extLst>
+                    <a:ext uri="{9D8B030D-6E8A-4147-A177-3AD203B41FA5}">
+                      <a16:colId xmlns:a16="http://schemas.microsoft.com/office/drawing/2014/main" val="20002"/>
+                    </a:ext>
+                  </a:extLst>
+                </a:gridCol>
+              </a:tblGrid>
+              <a:tr h="650523">
+                <a:tc>
+                  <a:txBody>
+                    <a:bodyPr/>
+                    <a:lstStyle/>
+                    <a:p>
+                      <a:pPr marL="176213" marR="0" lvl="0" indent="-176213" algn="ctr" defTabSz="914400" rtl="0" eaLnBrk="0" fontAlgn="b" latinLnBrk="0" hangingPunct="0">
+                        <a:lnSpc>
+                          <a:spcPct val="100000"/>
+                        </a:lnSpc>
+                        <a:spcBef>
+                          <a:spcPct val="0"/>
+                        </a:spcBef>
+                        <a:spcAft>
+                          <a:spcPct val="0"/>
+                        </a:spcAft>
+                        <a:buClrTx/>
+                        <a:buSzTx/>
+                        <a:buFontTx/>
+                        <a:buNone/>
+                        <a:tabLst/>
+                      </a:pPr>
+                      <a:r>
+                        <a:rPr kumimoji="0" lang="en-US" sz="2500" b="0" i="0" u="none" strike="noStrike" cap="none" normalizeH="0" baseline="0" dirty="0">
+                          <a:ln>
+                            <a:noFill/>
+                          </a:ln>
+                          <a:solidFill>
+                            <a:schemeClr val="bg2"/>
+                          </a:solidFill>
+                          <a:effectLst/>
+                          <a:latin typeface="+mj-lt"/>
+                          <a:ea typeface="MS PGothic" charset="0"/>
+                          <a:cs typeface="Arial" charset="0"/>
+                        </a:rPr>
+                        <a:t>Links You Need</a:t>
+                      </a:r>
+                    </a:p>
+                  </a:txBody>
+                  <a:tcPr marL="121927" marR="121927" marT="45691" marB="45691" anchor="ctr" horzOverflow="overflow">
+                    <a:lnL w="12700" cap="flat" cmpd="sng" algn="ctr">
+                      <a:solidFill>
+                        <a:srgbClr val="000000"/>
+                      </a:solidFill>
+                      <a:prstDash val="solid"/>
+                      <a:round/>
+                      <a:headEnd type="none" w="med" len="med"/>
+                      <a:tailEnd type="none" w="med" len="med"/>
+                    </a:lnL>
+                    <a:lnR w="12700" cap="flat" cmpd="sng" algn="ctr">
+                      <a:solidFill>
+                        <a:srgbClr val="000000"/>
+                      </a:solidFill>
+                      <a:prstDash val="solid"/>
+                      <a:round/>
+                      <a:headEnd type="none" w="med" len="med"/>
+                      <a:tailEnd type="none" w="med" len="med"/>
+                    </a:lnR>
+                    <a:lnT w="12700" cap="flat" cmpd="sng" algn="ctr">
+                      <a:solidFill>
+                        <a:srgbClr val="000000"/>
+                      </a:solidFill>
+                      <a:prstDash val="solid"/>
+                      <a:round/>
+                      <a:headEnd type="none" w="med" len="med"/>
+                      <a:tailEnd type="none" w="med" len="med"/>
+                    </a:lnT>
+                    <a:lnB w="12700" cap="flat" cmpd="sng" algn="ctr">
+                      <a:solidFill>
+                        <a:srgbClr val="000000"/>
+                      </a:solidFill>
+                      <a:prstDash val="solid"/>
+                      <a:round/>
+                      <a:headEnd type="none" w="med" len="med"/>
+                      <a:tailEnd type="none" w="med" len="med"/>
+                    </a:lnB>
+                    <a:lnTlToBr>
+                      <a:noFill/>
+                    </a:lnTlToBr>
+                    <a:lnBlToTr>
+                      <a:noFill/>
+                    </a:lnBlToTr>
+                    <a:solidFill>
+                      <a:srgbClr val="4E87C0"/>
+                    </a:solidFill>
+                  </a:tcPr>
+                </a:tc>
+                <a:tc>
+                  <a:txBody>
+                    <a:bodyPr/>
+                    <a:lstStyle/>
+                    <a:p>
+                      <a:pPr marL="0" marR="0" lvl="0" indent="0" algn="ctr" defTabSz="914400" rtl="0" eaLnBrk="1" fontAlgn="base" latinLnBrk="0" hangingPunct="1">
+                        <a:lnSpc>
+                          <a:spcPct val="100000"/>
+                        </a:lnSpc>
+                        <a:spcBef>
+                          <a:spcPct val="0"/>
+                        </a:spcBef>
+                        <a:spcAft>
+                          <a:spcPct val="0"/>
+                        </a:spcAft>
+                        <a:buClrTx/>
+                        <a:buSzTx/>
+                        <a:buFontTx/>
+                        <a:buNone/>
+                        <a:tabLst/>
+                      </a:pPr>
+                      <a:r>
+                        <a:rPr kumimoji="0" lang="en-US" sz="2500" b="0" i="0" u="none" strike="noStrike" cap="none" normalizeH="0" baseline="0" dirty="0">
+                          <a:ln>
+                            <a:noFill/>
+                          </a:ln>
+                          <a:solidFill>
+                            <a:schemeClr val="bg2"/>
+                          </a:solidFill>
+                          <a:effectLst/>
+                          <a:latin typeface="+mj-lt"/>
+                          <a:ea typeface="MS PGothic" charset="0"/>
+                          <a:cs typeface="Arial" charset="0"/>
+                        </a:rPr>
+                        <a:t>Twitter</a:t>
+                      </a:r>
+                    </a:p>
+                  </a:txBody>
+                  <a:tcPr marL="121927" marR="121927" marT="45691" marB="45691" anchor="ctr" horzOverflow="overflow">
+                    <a:lnL w="12700" cap="flat" cmpd="sng" algn="ctr">
+                      <a:solidFill>
+                        <a:srgbClr val="000000"/>
+                      </a:solidFill>
+                      <a:prstDash val="solid"/>
+                      <a:round/>
+                      <a:headEnd type="none" w="med" len="med"/>
+                      <a:tailEnd type="none" w="med" len="med"/>
+                    </a:lnL>
+                    <a:lnR w="12700" cap="flat" cmpd="sng" algn="ctr">
+                      <a:solidFill>
+                        <a:srgbClr val="000000"/>
+                      </a:solidFill>
+                      <a:prstDash val="solid"/>
+                      <a:round/>
+                      <a:headEnd type="none" w="med" len="med"/>
+                      <a:tailEnd type="none" w="med" len="med"/>
+                    </a:lnR>
+                    <a:lnT w="12700" cap="flat" cmpd="sng" algn="ctr">
+                      <a:solidFill>
+                        <a:srgbClr val="000000"/>
+                      </a:solidFill>
+                      <a:prstDash val="solid"/>
+                      <a:round/>
+                      <a:headEnd type="none" w="med" len="med"/>
+                      <a:tailEnd type="none" w="med" len="med"/>
+                    </a:lnT>
+                    <a:lnB w="12700" cap="flat" cmpd="sng" algn="ctr">
+                      <a:solidFill>
+                        <a:srgbClr val="000000"/>
+                      </a:solidFill>
+                      <a:prstDash val="solid"/>
+                      <a:round/>
+                      <a:headEnd type="none" w="med" len="med"/>
+                      <a:tailEnd type="none" w="med" len="med"/>
+                    </a:lnB>
+                    <a:lnTlToBr>
+                      <a:noFill/>
+                    </a:lnTlToBr>
+                    <a:lnBlToTr>
+                      <a:noFill/>
+                    </a:lnBlToTr>
+                    <a:solidFill>
+                      <a:srgbClr val="4E87C0"/>
+                    </a:solidFill>
+                  </a:tcPr>
+                </a:tc>
+                <a:tc>
+                  <a:txBody>
+                    <a:bodyPr/>
+                    <a:lstStyle/>
+                    <a:p>
+                      <a:pPr marL="0" marR="0" lvl="0" indent="0" algn="ctr" defTabSz="914400" rtl="0" eaLnBrk="1" fontAlgn="base" latinLnBrk="0" hangingPunct="1">
+                        <a:lnSpc>
+                          <a:spcPct val="100000"/>
+                        </a:lnSpc>
+                        <a:spcBef>
+                          <a:spcPct val="0"/>
+                        </a:spcBef>
+                        <a:spcAft>
+                          <a:spcPct val="0"/>
+                        </a:spcAft>
+                        <a:buClrTx/>
+                        <a:buSzTx/>
+                        <a:buFontTx/>
+                        <a:buNone/>
+                        <a:tabLst/>
+                      </a:pPr>
+                      <a:r>
+                        <a:rPr kumimoji="0" lang="en-US" sz="2500" b="0" i="0" u="none" strike="noStrike" cap="none" normalizeH="0" baseline="0" dirty="0">
+                          <a:ln>
+                            <a:noFill/>
+                          </a:ln>
+                          <a:solidFill>
+                            <a:schemeClr val="bg2"/>
+                          </a:solidFill>
+                          <a:effectLst/>
+                          <a:latin typeface="+mj-lt"/>
+                          <a:ea typeface="MS PGothic" charset="0"/>
+                          <a:cs typeface="Arial" charset="0"/>
+                        </a:rPr>
+                        <a:t>#Hashtags</a:t>
+                      </a:r>
+                    </a:p>
+                  </a:txBody>
+                  <a:tcPr marL="121927" marR="121927" marT="45691" marB="45691" anchor="ctr" horzOverflow="overflow">
+                    <a:lnL w="12700" cap="flat" cmpd="sng" algn="ctr">
+                      <a:solidFill>
+                        <a:srgbClr val="000000"/>
+                      </a:solidFill>
+                      <a:prstDash val="solid"/>
+                      <a:round/>
+                      <a:headEnd type="none" w="med" len="med"/>
+                      <a:tailEnd type="none" w="med" len="med"/>
+                    </a:lnL>
+                    <a:lnR w="12700" cap="flat" cmpd="sng" algn="ctr">
+                      <a:solidFill>
+                        <a:srgbClr val="000000"/>
+                      </a:solidFill>
+                      <a:prstDash val="solid"/>
+                      <a:round/>
+                      <a:headEnd type="none" w="med" len="med"/>
+                      <a:tailEnd type="none" w="med" len="med"/>
+                    </a:lnR>
+                    <a:lnT w="12700" cap="flat" cmpd="sng" algn="ctr">
+                      <a:solidFill>
+                        <a:srgbClr val="000000"/>
+                      </a:solidFill>
+                      <a:prstDash val="solid"/>
+                      <a:round/>
+                      <a:headEnd type="none" w="med" len="med"/>
+                      <a:tailEnd type="none" w="med" len="med"/>
+                    </a:lnT>
+                    <a:lnB w="12700" cap="flat" cmpd="sng" algn="ctr">
+                      <a:solidFill>
+                        <a:srgbClr val="000000"/>
+                      </a:solidFill>
+                      <a:prstDash val="solid"/>
+                      <a:round/>
+                      <a:headEnd type="none" w="med" len="med"/>
+                      <a:tailEnd type="none" w="med" len="med"/>
+                    </a:lnB>
+                    <a:lnTlToBr>
+                      <a:noFill/>
+                    </a:lnTlToBr>
+                    <a:lnBlToTr>
+                      <a:noFill/>
+                    </a:lnBlToTr>
+                    <a:solidFill>
+                      <a:srgbClr val="4E87C0"/>
+                    </a:solidFill>
+                  </a:tcPr>
+                </a:tc>
+                <a:extLst>
+                  <a:ext uri="{0D108BD9-81ED-4DB2-BD59-A6C34878D82A}">
+                    <a16:rowId xmlns:a16="http://schemas.microsoft.com/office/drawing/2014/main" val="10000"/>
+                  </a:ext>
+                </a:extLst>
+              </a:tr>
+              <a:tr h="5008821">
+                <a:tc>
+                  <a:txBody>
+                    <a:bodyPr/>
+                    <a:lstStyle/>
+                    <a:p>
+                      <a:pPr marL="0" marR="0" lvl="0" indent="0" algn="l" defTabSz="914400" rtl="0" eaLnBrk="0" fontAlgn="b" latinLnBrk="0" hangingPunct="0">
+                        <a:lnSpc>
+                          <a:spcPct val="100000"/>
+                        </a:lnSpc>
+                        <a:spcBef>
+                          <a:spcPct val="0"/>
+                        </a:spcBef>
+                        <a:spcAft>
+                          <a:spcPct val="0"/>
+                        </a:spcAft>
+                        <a:buClrTx/>
+                        <a:buSzTx/>
+                        <a:buFont typeface="Arial" charset="0"/>
+                        <a:buNone/>
+                        <a:tabLst/>
+                      </a:pPr>
+                      <a:r>
+                        <a:rPr kumimoji="0" lang="en-US" sz="1500" b="0" i="0" u="none" strike="noStrike" cap="none" normalizeH="0" baseline="0" dirty="0">
+                          <a:ln>
+                            <a:noFill/>
+                          </a:ln>
+                          <a:solidFill>
+                            <a:schemeClr val="tx1"/>
+                          </a:solidFill>
+                          <a:effectLst/>
+                          <a:latin typeface="+mj-lt"/>
+                          <a:ea typeface="MS PGothic" charset="0"/>
+                          <a:cs typeface="Arial" charset="0"/>
+                        </a:rPr>
+                        <a:t>IBM i Home Page:    </a:t>
+                      </a:r>
+                      <a:r>
+                        <a:rPr kumimoji="0" lang="en-US" sz="1500" b="0" i="0" u="none" strike="noStrike" cap="none" normalizeH="0" baseline="0" dirty="0">
+                          <a:ln>
+                            <a:noFill/>
+                          </a:ln>
+                          <a:solidFill>
+                            <a:schemeClr val="tx1"/>
+                          </a:solidFill>
+                          <a:effectLst/>
+                          <a:latin typeface="+mj-lt"/>
+                          <a:ea typeface="MS PGothic" charset="0"/>
+                          <a:cs typeface="Arial" charset="0"/>
+                          <a:hlinkClick r:id="rId2"/>
+                        </a:rPr>
+                        <a:t>https://www.ibm.com/it-infrastructure/power/os/ibm-i</a:t>
+                      </a:r>
+                      <a:endParaRPr kumimoji="0" lang="en-US" sz="1500" b="0" i="0" u="none" strike="noStrike" cap="none" normalizeH="0" baseline="0" dirty="0">
+                        <a:ln>
+                          <a:noFill/>
+                        </a:ln>
+                        <a:solidFill>
+                          <a:schemeClr val="tx1"/>
+                        </a:solidFill>
+                        <a:effectLst/>
+                        <a:latin typeface="+mj-lt"/>
+                        <a:ea typeface="MS PGothic" charset="0"/>
+                        <a:cs typeface="Arial" charset="0"/>
+                      </a:endParaRPr>
+                    </a:p>
+                    <a:p>
+                      <a:pPr marL="0" marR="0" lvl="0" indent="0" algn="l" defTabSz="914400" rtl="0" eaLnBrk="0" fontAlgn="b" latinLnBrk="0" hangingPunct="0">
+                        <a:lnSpc>
+                          <a:spcPct val="100000"/>
+                        </a:lnSpc>
+                        <a:spcBef>
+                          <a:spcPct val="0"/>
+                        </a:spcBef>
+                        <a:spcAft>
+                          <a:spcPct val="0"/>
+                        </a:spcAft>
+                        <a:buClrTx/>
+                        <a:buSzTx/>
+                        <a:buFont typeface="Arial" charset="0"/>
+                        <a:buNone/>
+                        <a:tabLst/>
+                      </a:pPr>
+                      <a:r>
+                        <a:rPr kumimoji="0" lang="en-US" sz="1500" b="0" i="0" u="none" strike="noStrike" cap="none" normalizeH="0" baseline="0" dirty="0">
+                          <a:ln>
+                            <a:noFill/>
+                          </a:ln>
+                          <a:solidFill>
+                            <a:schemeClr val="tx1"/>
+                          </a:solidFill>
+                          <a:effectLst/>
+                          <a:latin typeface="+mj-lt"/>
+                          <a:ea typeface="MS PGothic" charset="0"/>
+                          <a:cs typeface="Arial" charset="0"/>
+                        </a:rPr>
+                        <a:t>(find link to Forrester Study and updated IBM </a:t>
+                      </a:r>
+                      <a:r>
+                        <a:rPr kumimoji="0" lang="en-US" sz="1500" b="0" i="0" u="none" strike="noStrike" cap="none" normalizeH="0" baseline="0" dirty="0" err="1">
+                          <a:ln>
+                            <a:noFill/>
+                          </a:ln>
+                          <a:solidFill>
+                            <a:schemeClr val="tx1"/>
+                          </a:solidFill>
+                          <a:effectLst/>
+                          <a:latin typeface="+mj-lt"/>
+                          <a:ea typeface="MS PGothic" charset="0"/>
+                          <a:cs typeface="Arial" charset="0"/>
+                        </a:rPr>
+                        <a:t>i</a:t>
+                      </a:r>
+                      <a:r>
+                        <a:rPr kumimoji="0" lang="en-US" sz="1500" b="0" i="0" u="none" strike="noStrike" cap="none" normalizeH="0" baseline="0" dirty="0">
+                          <a:ln>
+                            <a:noFill/>
+                          </a:ln>
+                          <a:solidFill>
+                            <a:schemeClr val="tx1"/>
+                          </a:solidFill>
+                          <a:effectLst/>
+                          <a:latin typeface="+mj-lt"/>
+                          <a:ea typeface="MS PGothic" charset="0"/>
+                          <a:cs typeface="Arial" charset="0"/>
+                        </a:rPr>
+                        <a:t> Strategy Whitepaper)</a:t>
+                      </a:r>
+                    </a:p>
+                    <a:p>
+                      <a:pPr marL="0" marR="0" lvl="0" indent="0" algn="l" defTabSz="914400" rtl="0" eaLnBrk="0" fontAlgn="b" latinLnBrk="0" hangingPunct="0">
+                        <a:lnSpc>
+                          <a:spcPct val="100000"/>
+                        </a:lnSpc>
+                        <a:spcBef>
+                          <a:spcPct val="0"/>
+                        </a:spcBef>
+                        <a:spcAft>
+                          <a:spcPct val="0"/>
+                        </a:spcAft>
+                        <a:buClrTx/>
+                        <a:buSzTx/>
+                        <a:buFont typeface="Arial" charset="0"/>
+                        <a:buNone/>
+                        <a:tabLst/>
+                      </a:pPr>
+                      <a:endParaRPr kumimoji="0" lang="en-US" sz="1500" b="0" i="0" u="none" strike="noStrike" cap="none" normalizeH="0" baseline="0" dirty="0">
+                        <a:ln>
+                          <a:noFill/>
+                        </a:ln>
+                        <a:solidFill>
+                          <a:schemeClr val="tx1"/>
+                        </a:solidFill>
+                        <a:effectLst/>
+                        <a:latin typeface="+mj-lt"/>
+                        <a:ea typeface="MS PGothic" charset="0"/>
+                        <a:cs typeface="Arial" charset="0"/>
+                      </a:endParaRPr>
+                    </a:p>
+                    <a:p>
+                      <a:pPr marL="0" marR="0" lvl="0" indent="0" algn="l" defTabSz="914400" rtl="0" eaLnBrk="0" fontAlgn="b" latinLnBrk="0" hangingPunct="0">
+                        <a:lnSpc>
+                          <a:spcPct val="100000"/>
+                        </a:lnSpc>
+                        <a:spcBef>
+                          <a:spcPct val="0"/>
+                        </a:spcBef>
+                        <a:spcAft>
+                          <a:spcPct val="0"/>
+                        </a:spcAft>
+                        <a:buClrTx/>
+                        <a:buSzTx/>
+                        <a:buFont typeface="Arial" charset="0"/>
+                        <a:buNone/>
+                        <a:tabLst/>
+                      </a:pPr>
+                      <a:r>
+                        <a:rPr kumimoji="0" lang="en-US" sz="1500" b="0" i="0" u="none" strike="noStrike" cap="none" normalizeH="0" baseline="0" dirty="0">
+                          <a:ln>
+                            <a:noFill/>
+                          </a:ln>
+                          <a:solidFill>
+                            <a:schemeClr val="tx1"/>
+                          </a:solidFill>
+                          <a:effectLst/>
+                          <a:latin typeface="+mj-lt"/>
+                          <a:ea typeface="MS PGothic" charset="0"/>
+                          <a:cs typeface="Arial" charset="0"/>
+                        </a:rPr>
+                        <a:t>IBM Strategy Whitepaper:   </a:t>
+                      </a:r>
+                      <a:r>
+                        <a:rPr kumimoji="0" lang="en-US" sz="1500" b="0" i="0" u="none" strike="noStrike" cap="none" normalizeH="0" baseline="0" dirty="0">
+                          <a:ln>
+                            <a:noFill/>
+                          </a:ln>
+                          <a:solidFill>
+                            <a:schemeClr val="tx1"/>
+                          </a:solidFill>
+                          <a:effectLst/>
+                          <a:latin typeface="+mj-lt"/>
+                          <a:ea typeface="MS PGothic" charset="0"/>
+                          <a:cs typeface="Arial" charset="0"/>
+                          <a:hlinkClick r:id="rId3"/>
+                        </a:rPr>
+                        <a:t>https://www.ibm.com/it-infrastructure/us-en/resources/power/i-strategy-roadmap/</a:t>
+                      </a:r>
+                      <a:endParaRPr kumimoji="0" lang="en-US" sz="1500" b="0" i="0" u="none" strike="noStrike" cap="none" normalizeH="0" baseline="0" dirty="0">
+                        <a:ln>
+                          <a:noFill/>
+                        </a:ln>
+                        <a:solidFill>
+                          <a:schemeClr val="tx1"/>
+                        </a:solidFill>
+                        <a:effectLst/>
+                        <a:latin typeface="+mj-lt"/>
+                        <a:ea typeface="MS PGothic" charset="0"/>
+                        <a:cs typeface="Arial" charset="0"/>
+                      </a:endParaRPr>
+                    </a:p>
+                    <a:p>
+                      <a:pPr marL="0" marR="0" lvl="0" indent="0" algn="l" defTabSz="914400" rtl="0" eaLnBrk="0" fontAlgn="b" latinLnBrk="0" hangingPunct="0">
+                        <a:lnSpc>
+                          <a:spcPct val="100000"/>
+                        </a:lnSpc>
+                        <a:spcBef>
+                          <a:spcPct val="0"/>
+                        </a:spcBef>
+                        <a:spcAft>
+                          <a:spcPct val="0"/>
+                        </a:spcAft>
+                        <a:buClrTx/>
+                        <a:buSzTx/>
+                        <a:buFont typeface="Arial" charset="0"/>
+                        <a:buNone/>
+                        <a:tabLst/>
+                      </a:pPr>
+                      <a:endParaRPr kumimoji="0" lang="en-US" sz="1500" b="0" i="0" u="none" strike="noStrike" cap="none" normalizeH="0" baseline="0" dirty="0">
+                        <a:ln>
+                          <a:noFill/>
+                        </a:ln>
+                        <a:solidFill>
+                          <a:schemeClr val="tx1"/>
+                        </a:solidFill>
+                        <a:effectLst/>
+                        <a:latin typeface="+mj-lt"/>
+                        <a:ea typeface="MS PGothic" charset="0"/>
+                        <a:cs typeface="Arial" charset="0"/>
+                      </a:endParaRPr>
+                    </a:p>
+                    <a:p>
+                      <a:pPr marL="0" marR="0" lvl="0" indent="0" algn="l" defTabSz="914400" rtl="0" eaLnBrk="0" fontAlgn="b" latinLnBrk="0" hangingPunct="0">
+                        <a:lnSpc>
+                          <a:spcPct val="100000"/>
+                        </a:lnSpc>
+                        <a:spcBef>
+                          <a:spcPct val="0"/>
+                        </a:spcBef>
+                        <a:spcAft>
+                          <a:spcPct val="0"/>
+                        </a:spcAft>
+                        <a:buClrTx/>
+                        <a:buSzTx/>
+                        <a:buFont typeface="Arial" charset="0"/>
+                        <a:buNone/>
+                        <a:tabLst/>
+                      </a:pPr>
+                      <a:r>
+                        <a:rPr kumimoji="0" lang="en-US" sz="1500" b="0" i="0" u="none" strike="noStrike" cap="none" normalizeH="0" baseline="0" dirty="0">
+                          <a:ln>
+                            <a:noFill/>
+                          </a:ln>
+                          <a:solidFill>
+                            <a:schemeClr val="tx1"/>
+                          </a:solidFill>
+                          <a:effectLst/>
+                          <a:latin typeface="+mj-lt"/>
+                          <a:ea typeface="MS PGothic" charset="0"/>
+                          <a:cs typeface="Arial" charset="0"/>
+                        </a:rPr>
+                        <a:t>IBM Client Success:   </a:t>
+                      </a:r>
+                      <a:r>
+                        <a:rPr lang="en-US" sz="1500" u="sng" dirty="0">
+                          <a:latin typeface="+mj-lt"/>
+                          <a:hlinkClick r:id="rId4"/>
+                        </a:rPr>
+                        <a:t>https://www.ibm.com/it-infrastructure/us-en/resources/power/ibm-i-customer-stories/</a:t>
+                      </a:r>
+                      <a:endParaRPr lang="en-US" sz="1500" u="sng" dirty="0">
+                        <a:latin typeface="+mj-lt"/>
+                      </a:endParaRPr>
+                    </a:p>
+                    <a:p>
+                      <a:pPr marL="0" marR="0" lvl="0" indent="0" algn="l" defTabSz="914400" rtl="0" eaLnBrk="0" fontAlgn="b" latinLnBrk="0" hangingPunct="0">
+                        <a:lnSpc>
+                          <a:spcPct val="100000"/>
+                        </a:lnSpc>
+                        <a:spcBef>
+                          <a:spcPct val="0"/>
+                        </a:spcBef>
+                        <a:spcAft>
+                          <a:spcPct val="0"/>
+                        </a:spcAft>
+                        <a:buClrTx/>
+                        <a:buSzTx/>
+                        <a:buFont typeface="Arial" charset="0"/>
+                        <a:buNone/>
+                        <a:tabLst/>
+                      </a:pPr>
+                      <a:endParaRPr kumimoji="0" lang="en-US" sz="1500" b="0" i="0" u="none" strike="noStrike" cap="none" normalizeH="0" baseline="0" dirty="0">
+                        <a:ln>
+                          <a:noFill/>
+                        </a:ln>
+                        <a:solidFill>
+                          <a:schemeClr val="tx1"/>
+                        </a:solidFill>
+                        <a:effectLst/>
+                        <a:latin typeface="+mj-lt"/>
+                        <a:ea typeface="MS PGothic" charset="0"/>
+                        <a:cs typeface="Arial" charset="0"/>
+                      </a:endParaRPr>
+                    </a:p>
+                    <a:p>
+                      <a:pPr marL="0" marR="0" lvl="0" indent="0" algn="l" defTabSz="914400" rtl="0" eaLnBrk="0" fontAlgn="b" latinLnBrk="0" hangingPunct="0">
+                        <a:lnSpc>
+                          <a:spcPct val="100000"/>
+                        </a:lnSpc>
+                        <a:spcBef>
+                          <a:spcPct val="0"/>
+                        </a:spcBef>
+                        <a:spcAft>
+                          <a:spcPct val="0"/>
+                        </a:spcAft>
+                        <a:buClrTx/>
+                        <a:buSzTx/>
+                        <a:buFont typeface="Arial" charset="0"/>
+                        <a:buNone/>
+                        <a:tabLst/>
+                      </a:pPr>
+                      <a:r>
+                        <a:rPr kumimoji="0" lang="en-US" sz="1500" b="0" i="0" u="none" strike="noStrike" cap="none" normalizeH="0" baseline="0" dirty="0">
+                          <a:ln>
+                            <a:noFill/>
+                          </a:ln>
+                          <a:solidFill>
+                            <a:schemeClr val="tx1"/>
+                          </a:solidFill>
+                          <a:effectLst/>
+                          <a:latin typeface="+mj-lt"/>
+                          <a:ea typeface="MS PGothic" charset="0"/>
+                          <a:cs typeface="Arial" charset="0"/>
+                        </a:rPr>
+                        <a:t>Support Life Cycle:   </a:t>
+                      </a:r>
+                      <a:r>
+                        <a:rPr kumimoji="0" lang="en-US" sz="1500" b="0" i="0" u="none" strike="noStrike" cap="none" normalizeH="0" baseline="0" dirty="0">
+                          <a:ln>
+                            <a:noFill/>
+                          </a:ln>
+                          <a:solidFill>
+                            <a:schemeClr val="tx1"/>
+                          </a:solidFill>
+                          <a:effectLst/>
+                          <a:latin typeface="+mj-lt"/>
+                          <a:ea typeface="MS PGothic" charset="0"/>
+                          <a:cs typeface="Arial" charset="0"/>
+                          <a:hlinkClick r:id="rId5"/>
+                        </a:rPr>
+                        <a:t>https://www.ibm.com/support/lifecycle/</a:t>
+                      </a:r>
+                      <a:endParaRPr kumimoji="0" lang="en-US" sz="1500" b="0" i="0" u="none" strike="noStrike" cap="none" normalizeH="0" baseline="0" dirty="0">
+                        <a:ln>
+                          <a:noFill/>
+                        </a:ln>
+                        <a:solidFill>
+                          <a:schemeClr val="tx1"/>
+                        </a:solidFill>
+                        <a:effectLst/>
+                        <a:latin typeface="+mj-lt"/>
+                        <a:ea typeface="MS PGothic" charset="0"/>
+                        <a:cs typeface="Arial" charset="0"/>
+                      </a:endParaRPr>
+                    </a:p>
+                    <a:p>
+                      <a:pPr marL="0" marR="0" lvl="0" indent="0" algn="l" defTabSz="914400" rtl="0" eaLnBrk="0" fontAlgn="b" latinLnBrk="0" hangingPunct="0">
+                        <a:lnSpc>
+                          <a:spcPct val="100000"/>
+                        </a:lnSpc>
+                        <a:spcBef>
+                          <a:spcPct val="0"/>
+                        </a:spcBef>
+                        <a:spcAft>
+                          <a:spcPct val="0"/>
+                        </a:spcAft>
+                        <a:buClrTx/>
+                        <a:buSzTx/>
+                        <a:buFont typeface="Arial" charset="0"/>
+                        <a:buNone/>
+                        <a:tabLst/>
+                      </a:pPr>
+                      <a:endParaRPr kumimoji="0" lang="en-US" sz="1500" b="0" i="0" u="none" strike="noStrike" cap="none" normalizeH="0" baseline="0" dirty="0">
+                        <a:ln>
+                          <a:noFill/>
+                        </a:ln>
+                        <a:solidFill>
+                          <a:schemeClr val="tx1"/>
+                        </a:solidFill>
+                        <a:effectLst/>
+                        <a:latin typeface="+mj-lt"/>
+                        <a:ea typeface="MS PGothic" charset="0"/>
+                        <a:cs typeface="Arial" charset="0"/>
+                      </a:endParaRPr>
+                    </a:p>
+                    <a:p>
+                      <a:pPr marL="0" marR="0" lvl="0" indent="0" algn="l" defTabSz="914400" rtl="0" eaLnBrk="0" fontAlgn="b" latinLnBrk="0" hangingPunct="0">
+                        <a:lnSpc>
+                          <a:spcPct val="100000"/>
+                        </a:lnSpc>
+                        <a:spcBef>
+                          <a:spcPct val="0"/>
+                        </a:spcBef>
+                        <a:spcAft>
+                          <a:spcPct val="0"/>
+                        </a:spcAft>
+                        <a:buClrTx/>
+                        <a:buSzTx/>
+                        <a:buFont typeface="Arial" charset="0"/>
+                        <a:buNone/>
+                        <a:tabLst/>
+                      </a:pPr>
+                      <a:r>
+                        <a:rPr kumimoji="0" lang="en-US" sz="1500" b="0" i="0" u="none" strike="noStrike" cap="none" normalizeH="0" baseline="0" dirty="0">
+                          <a:ln>
+                            <a:noFill/>
+                          </a:ln>
+                          <a:solidFill>
+                            <a:schemeClr val="tx1"/>
+                          </a:solidFill>
+                          <a:effectLst/>
+                          <a:latin typeface="+mj-lt"/>
+                          <a:ea typeface="MS PGothic" charset="0"/>
+                          <a:cs typeface="Arial" charset="0"/>
+                        </a:rPr>
+                        <a:t>License Topics:   </a:t>
+                      </a:r>
+                      <a:r>
+                        <a:rPr kumimoji="0" lang="en-US" sz="1500" b="0" i="0" u="none" strike="noStrike" cap="none" normalizeH="0" baseline="0" dirty="0">
+                          <a:ln>
+                            <a:noFill/>
+                          </a:ln>
+                          <a:solidFill>
+                            <a:schemeClr val="tx1"/>
+                          </a:solidFill>
+                          <a:effectLst/>
+                          <a:latin typeface="+mj-lt"/>
+                          <a:ea typeface="MS PGothic" charset="0"/>
+                          <a:cs typeface="Arial" charset="0"/>
+                          <a:hlinkClick r:id="rId6"/>
+                        </a:rPr>
+                        <a:t>https://www-01.ibm.com/support/docview.wss?uid=nas8N1022087</a:t>
+                      </a:r>
+                      <a:endParaRPr kumimoji="0" lang="en-US" sz="1500" b="0" i="0" u="none" strike="noStrike" cap="none" normalizeH="0" baseline="0" dirty="0">
+                        <a:ln>
+                          <a:noFill/>
+                        </a:ln>
+                        <a:solidFill>
+                          <a:schemeClr val="tx1"/>
+                        </a:solidFill>
+                        <a:effectLst/>
+                        <a:latin typeface="+mj-lt"/>
+                        <a:ea typeface="MS PGothic" charset="0"/>
+                        <a:cs typeface="Arial" charset="0"/>
+                      </a:endParaRPr>
+                    </a:p>
+                    <a:p>
+                      <a:pPr marL="0" marR="0" lvl="0" indent="0" algn="l" defTabSz="914400" rtl="0" eaLnBrk="0" fontAlgn="b" latinLnBrk="0" hangingPunct="0">
+                        <a:lnSpc>
+                          <a:spcPct val="100000"/>
+                        </a:lnSpc>
+                        <a:spcBef>
+                          <a:spcPct val="0"/>
+                        </a:spcBef>
+                        <a:spcAft>
+                          <a:spcPct val="0"/>
+                        </a:spcAft>
+                        <a:buClrTx/>
+                        <a:buSzTx/>
+                        <a:buFont typeface="Arial" charset="0"/>
+                        <a:buNone/>
+                        <a:tabLst/>
+                      </a:pPr>
+                      <a:endParaRPr kumimoji="0" lang="en-US" sz="1500" b="0" i="0" u="none" strike="noStrike" cap="none" normalizeH="0" baseline="0" dirty="0">
+                        <a:ln>
+                          <a:noFill/>
+                        </a:ln>
+                        <a:solidFill>
+                          <a:schemeClr val="tx1"/>
+                        </a:solidFill>
+                        <a:effectLst/>
+                        <a:latin typeface="+mj-lt"/>
+                        <a:ea typeface="MS PGothic" charset="0"/>
+                        <a:cs typeface="Arial" charset="0"/>
+                      </a:endParaRPr>
+                    </a:p>
+                    <a:p>
+                      <a:pPr marL="0" marR="0" lvl="0" indent="0" algn="l" defTabSz="914400" rtl="0" eaLnBrk="0" fontAlgn="b" latinLnBrk="0" hangingPunct="0">
+                        <a:lnSpc>
+                          <a:spcPct val="100000"/>
+                        </a:lnSpc>
+                        <a:spcBef>
+                          <a:spcPct val="0"/>
+                        </a:spcBef>
+                        <a:spcAft>
+                          <a:spcPct val="0"/>
+                        </a:spcAft>
+                        <a:buClrTx/>
+                        <a:buSzTx/>
+                        <a:buFont typeface="Arial" charset="0"/>
+                        <a:buNone/>
+                        <a:tabLst/>
+                        <a:defRPr/>
+                      </a:pPr>
+                      <a:r>
+                        <a:rPr kumimoji="0" lang="en-US" sz="1500" b="0" i="0" u="none" strike="noStrike" cap="none" normalizeH="0" baseline="0" dirty="0" err="1">
+                          <a:ln>
+                            <a:noFill/>
+                          </a:ln>
+                          <a:solidFill>
+                            <a:schemeClr val="tx1"/>
+                          </a:solidFill>
+                          <a:effectLst/>
+                          <a:latin typeface="+mj-lt"/>
+                          <a:ea typeface="MS PGothic" charset="0"/>
+                          <a:cs typeface="Arial" charset="0"/>
+                        </a:rPr>
+                        <a:t>Fortra</a:t>
+                      </a:r>
+                      <a:r>
+                        <a:rPr kumimoji="0" lang="en-US" sz="1500" b="0" i="0" u="none" strike="noStrike" cap="none" normalizeH="0" baseline="0" dirty="0">
+                          <a:ln>
+                            <a:noFill/>
+                          </a:ln>
+                          <a:solidFill>
+                            <a:schemeClr val="tx1"/>
+                          </a:solidFill>
+                          <a:effectLst/>
+                          <a:latin typeface="+mj-lt"/>
+                          <a:ea typeface="MS PGothic" charset="0"/>
+                          <a:cs typeface="Arial" charset="0"/>
+                        </a:rPr>
+                        <a:t> IBM i Marketplace Survey </a:t>
+                      </a:r>
+                      <a:r>
+                        <a:rPr lang="en-US" sz="1500" dirty="0">
+                          <a:latin typeface="+mj-lt"/>
+                          <a:hlinkClick r:id="rId7"/>
+                        </a:rPr>
+                        <a:t>https://</a:t>
+                      </a:r>
+                      <a:r>
+                        <a:rPr lang="en-US" sz="1500" dirty="0" err="1">
+                          <a:latin typeface="+mj-lt"/>
+                          <a:hlinkClick r:id="rId7"/>
+                        </a:rPr>
+                        <a:t>www.fortra.com</a:t>
+                      </a:r>
+                      <a:r>
+                        <a:rPr lang="en-US" sz="1500" dirty="0">
+                          <a:latin typeface="+mj-lt"/>
+                          <a:hlinkClick r:id="rId7"/>
+                        </a:rPr>
+                        <a:t>/resources/guides/</a:t>
+                      </a:r>
+                      <a:r>
+                        <a:rPr lang="en-US" sz="1500" dirty="0" err="1">
+                          <a:latin typeface="+mj-lt"/>
+                          <a:hlinkClick r:id="rId7"/>
+                        </a:rPr>
+                        <a:t>ibm</a:t>
+                      </a:r>
+                      <a:r>
+                        <a:rPr lang="en-US" sz="1500" dirty="0">
+                          <a:latin typeface="+mj-lt"/>
+                          <a:hlinkClick r:id="rId7"/>
+                        </a:rPr>
+                        <a:t>-i-marketplace-survey-results</a:t>
+                      </a:r>
+                      <a:endParaRPr lang="en-US" sz="1500" dirty="0">
+                        <a:latin typeface="+mj-lt"/>
+                      </a:endParaRPr>
+                    </a:p>
+                  </a:txBody>
+                  <a:tcPr marL="121927" marR="121927" marT="45691" marB="45691" horzOverflow="overflow">
+                    <a:lnL w="12700" cap="flat" cmpd="sng" algn="ctr">
+                      <a:solidFill>
+                        <a:srgbClr val="000000"/>
+                      </a:solidFill>
+                      <a:prstDash val="solid"/>
+                      <a:round/>
+                      <a:headEnd type="none" w="med" len="med"/>
+                      <a:tailEnd type="none" w="med" len="med"/>
+                    </a:lnL>
+                    <a:lnR w="12700" cap="flat" cmpd="sng" algn="ctr">
+                      <a:solidFill>
+                        <a:srgbClr val="000000"/>
+                      </a:solidFill>
+                      <a:prstDash val="solid"/>
+                      <a:round/>
+                      <a:headEnd type="none" w="med" len="med"/>
+                      <a:tailEnd type="none" w="med" len="med"/>
+                    </a:lnR>
+                    <a:lnT w="12700" cap="flat" cmpd="sng" algn="ctr">
+                      <a:solidFill>
+                        <a:srgbClr val="000000"/>
+                      </a:solidFill>
+                      <a:prstDash val="solid"/>
+                      <a:round/>
+                      <a:headEnd type="none" w="med" len="med"/>
+                      <a:tailEnd type="none" w="med" len="med"/>
+                    </a:lnT>
+                    <a:lnB w="12700" cap="flat" cmpd="sng" algn="ctr">
+                      <a:solidFill>
+                        <a:srgbClr val="000000"/>
+                      </a:solidFill>
+                      <a:prstDash val="solid"/>
+                      <a:round/>
+                      <a:headEnd type="none" w="med" len="med"/>
+                      <a:tailEnd type="none" w="med" len="med"/>
+                    </a:lnB>
+                    <a:lnTlToBr>
+                      <a:noFill/>
+                    </a:lnTlToBr>
+                    <a:lnBlToTr>
+                      <a:noFill/>
+                    </a:lnBlToTr>
+                    <a:solidFill>
+                      <a:schemeClr val="bg2"/>
+                    </a:solidFill>
+                  </a:tcPr>
+                </a:tc>
+                <a:tc>
+                  <a:txBody>
+                    <a:bodyPr/>
+                    <a:lstStyle/>
+                    <a:p>
+                      <a:pPr marL="0" marR="0" lvl="0" indent="0" algn="ctr" defTabSz="914400" rtl="0" eaLnBrk="1" fontAlgn="base" latinLnBrk="0" hangingPunct="1">
+                        <a:lnSpc>
+                          <a:spcPct val="120000"/>
+                        </a:lnSpc>
+                        <a:spcBef>
+                          <a:spcPct val="0"/>
+                        </a:spcBef>
+                        <a:spcAft>
+                          <a:spcPct val="0"/>
+                        </a:spcAft>
+                        <a:buClr>
+                          <a:srgbClr val="000000"/>
+                        </a:buClr>
+                        <a:buSzTx/>
+                        <a:buFont typeface="Arial" charset="0"/>
+                        <a:buNone/>
+                        <a:tabLst/>
+                      </a:pPr>
+                      <a:r>
+                        <a:rPr kumimoji="0" lang="en-US" sz="1500" b="0" i="0" u="none" strike="noStrike" cap="none" normalizeH="0" baseline="0">
+                          <a:ln>
+                            <a:noFill/>
+                          </a:ln>
+                          <a:solidFill>
+                            <a:schemeClr val="tx1"/>
+                          </a:solidFill>
+                          <a:effectLst/>
+                          <a:latin typeface="+mj-lt"/>
+                          <a:ea typeface="MS PGothic" charset="0"/>
+                          <a:cs typeface="Arial" charset="0"/>
+                          <a:hlinkClick r:id="rId8"/>
+                        </a:rPr>
+                        <a:t>@IBMSystems</a:t>
+                      </a:r>
+                      <a:r>
+                        <a:rPr kumimoji="0" lang="en-US" sz="1500" b="0" i="0" u="none" strike="noStrike" cap="none" normalizeH="0" baseline="0">
+                          <a:ln>
+                            <a:noFill/>
+                          </a:ln>
+                          <a:solidFill>
+                            <a:schemeClr val="tx1"/>
+                          </a:solidFill>
+                          <a:effectLst/>
+                          <a:latin typeface="+mj-lt"/>
+                          <a:ea typeface="MS PGothic" charset="0"/>
+                          <a:cs typeface="Arial" charset="0"/>
+                        </a:rPr>
+                        <a:t> </a:t>
+                      </a:r>
+                    </a:p>
+                    <a:p>
+                      <a:pPr marL="0" marR="0" lvl="0" indent="0" algn="ctr" defTabSz="914400" rtl="0" eaLnBrk="1" fontAlgn="base" latinLnBrk="0" hangingPunct="1">
+                        <a:lnSpc>
+                          <a:spcPct val="120000"/>
+                        </a:lnSpc>
+                        <a:spcBef>
+                          <a:spcPct val="0"/>
+                        </a:spcBef>
+                        <a:spcAft>
+                          <a:spcPct val="0"/>
+                        </a:spcAft>
+                        <a:buClr>
+                          <a:srgbClr val="000000"/>
+                        </a:buClr>
+                        <a:buSzTx/>
+                        <a:buFont typeface="Arial" charset="0"/>
+                        <a:buNone/>
+                        <a:tabLst/>
+                      </a:pPr>
+                      <a:r>
+                        <a:rPr kumimoji="0" lang="en-US" sz="1500" b="0" i="0" u="none" strike="noStrike" cap="none" normalizeH="0" baseline="0">
+                          <a:ln>
+                            <a:noFill/>
+                          </a:ln>
+                          <a:solidFill>
+                            <a:schemeClr val="tx1"/>
+                          </a:solidFill>
+                          <a:effectLst/>
+                          <a:latin typeface="+mj-lt"/>
+                          <a:ea typeface="MS PGothic" charset="0"/>
+                          <a:cs typeface="Arial" charset="0"/>
+                          <a:hlinkClick r:id="rId9"/>
+                        </a:rPr>
+                        <a:t>@</a:t>
+                      </a:r>
+                      <a:r>
+                        <a:rPr kumimoji="0" lang="en-US" sz="1500" b="0" i="0" u="sng" strike="noStrike" cap="none" normalizeH="0" baseline="0">
+                          <a:ln>
+                            <a:noFill/>
+                          </a:ln>
+                          <a:solidFill>
+                            <a:schemeClr val="tx1"/>
+                          </a:solidFill>
+                          <a:effectLst/>
+                          <a:latin typeface="+mj-lt"/>
+                          <a:ea typeface="MS PGothic" charset="0"/>
+                          <a:cs typeface="Arial" charset="0"/>
+                          <a:hlinkClick r:id="rId9"/>
+                        </a:rPr>
+                        <a:t>COMMONug</a:t>
+                      </a:r>
+                      <a:endParaRPr kumimoji="0" lang="en-US" sz="1500" b="0" i="0" u="sng" strike="noStrike" cap="none" normalizeH="0" baseline="0">
+                        <a:ln>
+                          <a:noFill/>
+                        </a:ln>
+                        <a:solidFill>
+                          <a:schemeClr val="tx1"/>
+                        </a:solidFill>
+                        <a:effectLst/>
+                        <a:latin typeface="+mj-lt"/>
+                        <a:ea typeface="MS PGothic" charset="0"/>
+                        <a:cs typeface="Arial" charset="0"/>
+                      </a:endParaRPr>
+                    </a:p>
+                    <a:p>
+                      <a:pPr marL="0" marR="0" lvl="0" indent="0" algn="ctr" defTabSz="914400" rtl="0" eaLnBrk="1" fontAlgn="base" latinLnBrk="0" hangingPunct="1">
+                        <a:lnSpc>
+                          <a:spcPct val="120000"/>
+                        </a:lnSpc>
+                        <a:spcBef>
+                          <a:spcPct val="0"/>
+                        </a:spcBef>
+                        <a:spcAft>
+                          <a:spcPct val="0"/>
+                        </a:spcAft>
+                        <a:buClr>
+                          <a:srgbClr val="000000"/>
+                        </a:buClr>
+                        <a:buSzTx/>
+                        <a:buFont typeface="Arial" charset="0"/>
+                        <a:buNone/>
+                        <a:tabLst/>
+                      </a:pPr>
+                      <a:r>
+                        <a:rPr kumimoji="0" lang="en-US" sz="1500" b="0" i="0" u="none" strike="noStrike" cap="none" normalizeH="0" baseline="0">
+                          <a:ln>
+                            <a:noFill/>
+                          </a:ln>
+                          <a:solidFill>
+                            <a:schemeClr val="tx1"/>
+                          </a:solidFill>
+                          <a:effectLst/>
+                          <a:latin typeface="+mj-lt"/>
+                          <a:ea typeface="MS PGothic" charset="0"/>
+                          <a:cs typeface="Arial" charset="0"/>
+                          <a:hlinkClick r:id="rId10"/>
+                        </a:rPr>
+                        <a:t>@</a:t>
+                      </a:r>
+                      <a:r>
+                        <a:rPr kumimoji="0" lang="en-US" sz="1500" b="0" i="0" u="sng" strike="noStrike" cap="none" normalizeH="0" baseline="0">
+                          <a:ln>
+                            <a:noFill/>
+                          </a:ln>
+                          <a:solidFill>
+                            <a:schemeClr val="tx1"/>
+                          </a:solidFill>
+                          <a:effectLst/>
+                          <a:latin typeface="+mj-lt"/>
+                          <a:ea typeface="MS PGothic" charset="0"/>
+                          <a:cs typeface="Arial" charset="0"/>
+                          <a:hlinkClick r:id="rId10"/>
+                        </a:rPr>
+                        <a:t>IBMChampions</a:t>
+                      </a:r>
+                      <a:endParaRPr kumimoji="0" lang="en-US" sz="1500" b="0" i="0" u="sng" strike="noStrike" cap="none" normalizeH="0" baseline="0">
+                        <a:ln>
+                          <a:noFill/>
+                        </a:ln>
+                        <a:solidFill>
+                          <a:schemeClr val="tx1"/>
+                        </a:solidFill>
+                        <a:effectLst/>
+                        <a:latin typeface="+mj-lt"/>
+                        <a:ea typeface="MS PGothic" charset="0"/>
+                        <a:cs typeface="Arial" charset="0"/>
+                      </a:endParaRPr>
+                    </a:p>
+                    <a:p>
+                      <a:pPr marL="0" marR="0" lvl="0" indent="0" algn="ctr" defTabSz="914400" rtl="0" eaLnBrk="1" fontAlgn="base" latinLnBrk="0" hangingPunct="1">
+                        <a:lnSpc>
+                          <a:spcPct val="120000"/>
+                        </a:lnSpc>
+                        <a:spcBef>
+                          <a:spcPct val="0"/>
+                        </a:spcBef>
+                        <a:spcAft>
+                          <a:spcPct val="0"/>
+                        </a:spcAft>
+                        <a:buClr>
+                          <a:srgbClr val="000000"/>
+                        </a:buClr>
+                        <a:buSzTx/>
+                        <a:buFont typeface="Arial" charset="0"/>
+                        <a:buNone/>
+                        <a:tabLst/>
+                      </a:pPr>
+                      <a:r>
+                        <a:rPr kumimoji="0" lang="en-US" sz="1500" b="0" i="0" u="none" strike="noStrike" cap="none" normalizeH="0" baseline="0">
+                          <a:ln>
+                            <a:noFill/>
+                          </a:ln>
+                          <a:solidFill>
+                            <a:schemeClr val="tx1"/>
+                          </a:solidFill>
+                          <a:effectLst/>
+                          <a:latin typeface="+mj-lt"/>
+                          <a:ea typeface="MS PGothic" charset="0"/>
+                          <a:cs typeface="Arial" charset="0"/>
+                          <a:hlinkClick r:id="rId11"/>
+                        </a:rPr>
+                        <a:t>@</a:t>
+                      </a:r>
+                      <a:r>
+                        <a:rPr kumimoji="0" lang="en-US" sz="1500" b="0" i="0" u="sng" strike="noStrike" cap="none" normalizeH="0" baseline="0">
+                          <a:ln>
+                            <a:noFill/>
+                          </a:ln>
+                          <a:solidFill>
+                            <a:schemeClr val="tx1"/>
+                          </a:solidFill>
+                          <a:effectLst/>
+                          <a:latin typeface="+mj-lt"/>
+                          <a:ea typeface="MS PGothic" charset="0"/>
+                          <a:cs typeface="Arial" charset="0"/>
+                          <a:hlinkClick r:id="rId11"/>
+                        </a:rPr>
+                        <a:t>IBMSystemsISVs</a:t>
+                      </a:r>
+                      <a:endParaRPr kumimoji="0" lang="en-US" sz="1500" b="0" i="0" u="none" strike="noStrike" cap="none" normalizeH="0" baseline="0">
+                        <a:ln>
+                          <a:noFill/>
+                        </a:ln>
+                        <a:solidFill>
+                          <a:schemeClr val="tx1"/>
+                        </a:solidFill>
+                        <a:effectLst/>
+                        <a:latin typeface="+mj-lt"/>
+                        <a:ea typeface="MS PGothic" charset="0"/>
+                        <a:cs typeface="Arial" charset="0"/>
+                      </a:endParaRPr>
+                    </a:p>
+                    <a:p>
+                      <a:pPr marL="0" marR="0" lvl="0" indent="0" algn="ctr" defTabSz="914400" rtl="0" eaLnBrk="1" fontAlgn="base" latinLnBrk="0" hangingPunct="1">
+                        <a:lnSpc>
+                          <a:spcPct val="120000"/>
+                        </a:lnSpc>
+                        <a:spcBef>
+                          <a:spcPct val="0"/>
+                        </a:spcBef>
+                        <a:spcAft>
+                          <a:spcPct val="0"/>
+                        </a:spcAft>
+                        <a:buClr>
+                          <a:srgbClr val="000000"/>
+                        </a:buClr>
+                        <a:buSzTx/>
+                        <a:buFont typeface="Arial" charset="0"/>
+                        <a:buNone/>
+                        <a:tabLst/>
+                      </a:pPr>
+                      <a:r>
+                        <a:rPr kumimoji="0" lang="en-US" sz="1500" b="0" i="0" u="sng" strike="noStrike" cap="none" normalizeH="0" baseline="0">
+                          <a:ln>
+                            <a:noFill/>
+                          </a:ln>
+                          <a:solidFill>
+                            <a:schemeClr val="tx1"/>
+                          </a:solidFill>
+                          <a:effectLst/>
+                          <a:latin typeface="+mj-lt"/>
+                          <a:ea typeface="MS PGothic" charset="0"/>
+                          <a:cs typeface="Arial" charset="0"/>
+                          <a:hlinkClick r:id="rId12"/>
+                        </a:rPr>
+                        <a:t>@IBMiMag</a:t>
+                      </a:r>
+                      <a:r>
+                        <a:rPr kumimoji="0" lang="en-US" sz="1500" b="0" i="0" u="sng" strike="noStrike" cap="none" normalizeH="0" baseline="0">
+                          <a:ln>
+                            <a:noFill/>
+                          </a:ln>
+                          <a:solidFill>
+                            <a:schemeClr val="tx1"/>
+                          </a:solidFill>
+                          <a:effectLst/>
+                          <a:latin typeface="+mj-lt"/>
+                          <a:ea typeface="MS PGothic" charset="0"/>
+                          <a:cs typeface="Arial" charset="0"/>
+                        </a:rPr>
+                        <a:t> </a:t>
+                      </a:r>
+                    </a:p>
+                    <a:p>
+                      <a:pPr marL="0" marR="0" lvl="0" indent="0" algn="ctr" defTabSz="914400" rtl="0" eaLnBrk="1" fontAlgn="base" latinLnBrk="0" hangingPunct="1">
+                        <a:lnSpc>
+                          <a:spcPct val="120000"/>
+                        </a:lnSpc>
+                        <a:spcBef>
+                          <a:spcPct val="0"/>
+                        </a:spcBef>
+                        <a:spcAft>
+                          <a:spcPct val="0"/>
+                        </a:spcAft>
+                        <a:buClr>
+                          <a:srgbClr val="000000"/>
+                        </a:buClr>
+                        <a:buSzTx/>
+                        <a:buFont typeface="Arial" charset="0"/>
+                        <a:buNone/>
+                        <a:tabLst/>
+                      </a:pPr>
+                      <a:r>
+                        <a:rPr kumimoji="0" lang="en-US" sz="1500" b="0" i="0" u="sng" strike="noStrike" cap="none" normalizeH="0" baseline="0">
+                          <a:ln>
+                            <a:noFill/>
+                          </a:ln>
+                          <a:solidFill>
+                            <a:schemeClr val="tx1"/>
+                          </a:solidFill>
+                          <a:effectLst/>
+                          <a:latin typeface="+mj-lt"/>
+                          <a:ea typeface="MS PGothic" charset="0"/>
+                          <a:cs typeface="Arial" charset="0"/>
+                          <a:hlinkClick r:id="rId13"/>
+                        </a:rPr>
+                        <a:t>@ITJungleNews</a:t>
+                      </a:r>
+                      <a:r>
+                        <a:rPr kumimoji="0" lang="en-US" sz="1500" b="0" i="0" u="sng" strike="noStrike" cap="none" normalizeH="0" baseline="0">
+                          <a:ln>
+                            <a:noFill/>
+                          </a:ln>
+                          <a:solidFill>
+                            <a:schemeClr val="tx1"/>
+                          </a:solidFill>
+                          <a:effectLst/>
+                          <a:latin typeface="+mj-lt"/>
+                          <a:ea typeface="MS PGothic" charset="0"/>
+                          <a:cs typeface="Arial" charset="0"/>
+                        </a:rPr>
+                        <a:t> </a:t>
+                      </a:r>
+                    </a:p>
+                    <a:p>
+                      <a:pPr marL="0" marR="0" lvl="0" indent="0" algn="ctr" defTabSz="914400" rtl="0" eaLnBrk="1" fontAlgn="base" latinLnBrk="0" hangingPunct="1">
+                        <a:lnSpc>
+                          <a:spcPct val="120000"/>
+                        </a:lnSpc>
+                        <a:spcBef>
+                          <a:spcPct val="0"/>
+                        </a:spcBef>
+                        <a:spcAft>
+                          <a:spcPct val="0"/>
+                        </a:spcAft>
+                        <a:buClr>
+                          <a:srgbClr val="000000"/>
+                        </a:buClr>
+                        <a:buSzTx/>
+                        <a:buFont typeface="Arial" charset="0"/>
+                        <a:buNone/>
+                        <a:tabLst/>
+                      </a:pPr>
+                      <a:r>
+                        <a:rPr kumimoji="0" lang="en-US" sz="1500" b="0" i="0" u="none" strike="noStrike" cap="none" normalizeH="0" baseline="0">
+                          <a:ln>
+                            <a:noFill/>
+                          </a:ln>
+                          <a:solidFill>
+                            <a:schemeClr val="tx1"/>
+                          </a:solidFill>
+                          <a:effectLst/>
+                          <a:latin typeface="+mj-lt"/>
+                          <a:ea typeface="MS PGothic" charset="0"/>
+                          <a:cs typeface="Arial" charset="0"/>
+                          <a:hlinkClick r:id="rId14"/>
+                        </a:rPr>
+                        <a:t>@SAPonIBMi</a:t>
+                      </a:r>
+                      <a:r>
+                        <a:rPr kumimoji="0" lang="en-US" sz="1500" b="0" i="0" u="none" strike="noStrike" cap="none" normalizeH="0" baseline="0">
+                          <a:ln>
+                            <a:noFill/>
+                          </a:ln>
+                          <a:solidFill>
+                            <a:schemeClr val="tx1"/>
+                          </a:solidFill>
+                          <a:effectLst/>
+                          <a:latin typeface="+mj-lt"/>
+                          <a:ea typeface="MS PGothic" charset="0"/>
+                          <a:cs typeface="Arial" charset="0"/>
+                        </a:rPr>
+                        <a:t> </a:t>
+                      </a:r>
+                    </a:p>
+                    <a:p>
+                      <a:pPr marL="0" marR="0" lvl="0" indent="0" algn="ctr" defTabSz="914400" rtl="0" eaLnBrk="1" fontAlgn="base" latinLnBrk="0" hangingPunct="1">
+                        <a:lnSpc>
+                          <a:spcPct val="120000"/>
+                        </a:lnSpc>
+                        <a:spcBef>
+                          <a:spcPct val="0"/>
+                        </a:spcBef>
+                        <a:spcAft>
+                          <a:spcPct val="0"/>
+                        </a:spcAft>
+                        <a:buClr>
+                          <a:srgbClr val="000000"/>
+                        </a:buClr>
+                        <a:buSzTx/>
+                        <a:buFont typeface="Arial" charset="0"/>
+                        <a:buNone/>
+                        <a:tabLst/>
+                      </a:pPr>
+                      <a:r>
+                        <a:rPr kumimoji="0" lang="en-US" sz="1500" b="0" i="0" u="none" strike="noStrike" cap="none" normalizeH="0" baseline="0">
+                          <a:ln>
+                            <a:noFill/>
+                          </a:ln>
+                          <a:solidFill>
+                            <a:schemeClr val="tx1"/>
+                          </a:solidFill>
+                          <a:effectLst/>
+                          <a:latin typeface="+mj-lt"/>
+                          <a:ea typeface="MS PGothic" charset="0"/>
+                          <a:cs typeface="Arial" charset="0"/>
+                          <a:hlinkClick r:id="rId15"/>
+                        </a:rPr>
+                        <a:t>@</a:t>
+                      </a:r>
+                      <a:r>
+                        <a:rPr kumimoji="0" lang="en-US" sz="1500" b="0" i="0" u="sng" strike="noStrike" cap="none" normalizeH="0" baseline="0">
+                          <a:ln>
+                            <a:noFill/>
+                          </a:ln>
+                          <a:solidFill>
+                            <a:schemeClr val="tx1"/>
+                          </a:solidFill>
+                          <a:effectLst/>
+                          <a:latin typeface="+mj-lt"/>
+                          <a:ea typeface="MS PGothic" charset="0"/>
+                          <a:cs typeface="Arial" charset="0"/>
+                          <a:hlinkClick r:id="rId15"/>
+                        </a:rPr>
+                        <a:t>SiDforIBMi</a:t>
+                      </a:r>
+                      <a:endParaRPr kumimoji="0" lang="en-US" sz="1500" b="0" i="0" u="sng" strike="noStrike" cap="none" normalizeH="0" baseline="0">
+                        <a:ln>
+                          <a:noFill/>
+                        </a:ln>
+                        <a:solidFill>
+                          <a:schemeClr val="tx1"/>
+                        </a:solidFill>
+                        <a:effectLst/>
+                        <a:latin typeface="+mj-lt"/>
+                        <a:ea typeface="MS PGothic" charset="0"/>
+                        <a:cs typeface="Arial" charset="0"/>
+                      </a:endParaRPr>
+                    </a:p>
+                  </a:txBody>
+                  <a:tcPr marL="121927" marR="121927" marT="45691" marB="45691" anchor="ctr" horzOverflow="overflow">
+                    <a:lnL w="12700" cap="flat" cmpd="sng" algn="ctr">
+                      <a:solidFill>
+                        <a:srgbClr val="000000"/>
+                      </a:solidFill>
+                      <a:prstDash val="solid"/>
+                      <a:round/>
+                      <a:headEnd type="none" w="med" len="med"/>
+                      <a:tailEnd type="none" w="med" len="med"/>
+                    </a:lnL>
+                    <a:lnR w="12700" cap="flat" cmpd="sng" algn="ctr">
+                      <a:solidFill>
+                        <a:srgbClr val="000000"/>
+                      </a:solidFill>
+                      <a:prstDash val="solid"/>
+                      <a:round/>
+                      <a:headEnd type="none" w="med" len="med"/>
+                      <a:tailEnd type="none" w="med" len="med"/>
+                    </a:lnR>
+                    <a:lnT w="12700" cap="flat" cmpd="sng" algn="ctr">
+                      <a:solidFill>
+                        <a:srgbClr val="000000"/>
+                      </a:solidFill>
+                      <a:prstDash val="solid"/>
+                      <a:round/>
+                      <a:headEnd type="none" w="med" len="med"/>
+                      <a:tailEnd type="none" w="med" len="med"/>
+                    </a:lnT>
+                    <a:lnB w="12700" cap="flat" cmpd="sng" algn="ctr">
+                      <a:solidFill>
+                        <a:srgbClr val="000000"/>
+                      </a:solidFill>
+                      <a:prstDash val="solid"/>
+                      <a:round/>
+                      <a:headEnd type="none" w="med" len="med"/>
+                      <a:tailEnd type="none" w="med" len="med"/>
+                    </a:lnB>
+                    <a:lnTlToBr>
+                      <a:noFill/>
+                    </a:lnTlToBr>
+                    <a:lnBlToTr>
+                      <a:noFill/>
+                    </a:lnBlToTr>
+                    <a:solidFill>
+                      <a:schemeClr val="bg2"/>
+                    </a:solidFill>
+                  </a:tcPr>
+                </a:tc>
+                <a:tc>
+                  <a:txBody>
+                    <a:bodyPr/>
+                    <a:lstStyle/>
+                    <a:p>
+                      <a:pPr marL="0" marR="0" lvl="0" indent="0" algn="ctr" defTabSz="914400" rtl="0" eaLnBrk="1" fontAlgn="base" latinLnBrk="0" hangingPunct="1">
+                        <a:lnSpc>
+                          <a:spcPct val="120000"/>
+                        </a:lnSpc>
+                        <a:spcBef>
+                          <a:spcPct val="0"/>
+                        </a:spcBef>
+                        <a:spcAft>
+                          <a:spcPct val="0"/>
+                        </a:spcAft>
+                        <a:buClrTx/>
+                        <a:buSzTx/>
+                        <a:buFontTx/>
+                        <a:buNone/>
+                        <a:tabLst/>
+                      </a:pPr>
+                      <a:r>
+                        <a:rPr kumimoji="0" lang="en-US" sz="1500" b="0" i="0" u="none" strike="noStrike" cap="none" normalizeH="0" baseline="0" dirty="0">
+                          <a:ln>
+                            <a:noFill/>
+                          </a:ln>
+                          <a:solidFill>
+                            <a:schemeClr val="tx1"/>
+                          </a:solidFill>
+                          <a:effectLst/>
+                          <a:latin typeface="+mj-lt"/>
+                          <a:ea typeface="MS PGothic" charset="0"/>
+                          <a:cs typeface="Arial" charset="0"/>
+                        </a:rPr>
+                        <a:t>#</a:t>
+                      </a:r>
+                      <a:r>
+                        <a:rPr kumimoji="0" lang="en-US" sz="1500" b="0" i="0" u="none" strike="noStrike" cap="none" normalizeH="0" baseline="0" dirty="0" err="1">
+                          <a:ln>
+                            <a:noFill/>
+                          </a:ln>
+                          <a:solidFill>
+                            <a:schemeClr val="tx1"/>
+                          </a:solidFill>
+                          <a:effectLst/>
+                          <a:latin typeface="+mj-lt"/>
+                          <a:ea typeface="MS PGothic" charset="0"/>
+                          <a:cs typeface="Arial" charset="0"/>
+                        </a:rPr>
+                        <a:t>PowerSystems</a:t>
+                      </a:r>
+                      <a:endParaRPr kumimoji="0" lang="en-US" sz="1500" b="0" i="0" u="none" strike="noStrike" cap="none" normalizeH="0" baseline="0" dirty="0">
+                        <a:ln>
+                          <a:noFill/>
+                        </a:ln>
+                        <a:solidFill>
+                          <a:schemeClr val="tx1"/>
+                        </a:solidFill>
+                        <a:effectLst/>
+                        <a:latin typeface="+mj-lt"/>
+                        <a:ea typeface="MS PGothic" charset="0"/>
+                        <a:cs typeface="Arial" charset="0"/>
+                      </a:endParaRPr>
+                    </a:p>
+                    <a:p>
+                      <a:pPr marL="0" marR="0" lvl="0" indent="0" algn="ctr" defTabSz="914400" rtl="0" eaLnBrk="1" fontAlgn="base" latinLnBrk="0" hangingPunct="1">
+                        <a:lnSpc>
+                          <a:spcPct val="120000"/>
+                        </a:lnSpc>
+                        <a:spcBef>
+                          <a:spcPct val="0"/>
+                        </a:spcBef>
+                        <a:spcAft>
+                          <a:spcPct val="0"/>
+                        </a:spcAft>
+                        <a:buClrTx/>
+                        <a:buSzTx/>
+                        <a:buFontTx/>
+                        <a:buNone/>
+                        <a:tabLst/>
+                      </a:pPr>
+                      <a:r>
+                        <a:rPr kumimoji="0" lang="en-US" sz="1500" b="0" i="0" u="none" strike="noStrike" cap="none" normalizeH="0" baseline="0" dirty="0">
+                          <a:ln>
+                            <a:noFill/>
+                          </a:ln>
+                          <a:solidFill>
+                            <a:schemeClr val="tx1"/>
+                          </a:solidFill>
+                          <a:effectLst/>
+                          <a:latin typeface="+mj-lt"/>
+                          <a:ea typeface="MS PGothic" charset="0"/>
+                          <a:cs typeface="Arial" charset="0"/>
+                        </a:rPr>
+                        <a:t>#</a:t>
+                      </a:r>
+                      <a:r>
+                        <a:rPr kumimoji="0" lang="en-US" sz="1500" b="0" i="0" u="none" strike="noStrike" cap="none" normalizeH="0" baseline="0" dirty="0" err="1">
+                          <a:ln>
+                            <a:noFill/>
+                          </a:ln>
+                          <a:solidFill>
+                            <a:schemeClr val="tx1"/>
+                          </a:solidFill>
+                          <a:effectLst/>
+                          <a:latin typeface="+mj-lt"/>
+                          <a:ea typeface="MS PGothic" charset="0"/>
+                          <a:cs typeface="Arial" charset="0"/>
+                        </a:rPr>
+                        <a:t>IBMi</a:t>
+                      </a:r>
+                      <a:br>
+                        <a:rPr kumimoji="0" lang="en-US" sz="1500" b="0" i="0" u="none" strike="noStrike" cap="none" normalizeH="0" baseline="0" dirty="0">
+                          <a:ln>
+                            <a:noFill/>
+                          </a:ln>
+                          <a:solidFill>
+                            <a:schemeClr val="tx1"/>
+                          </a:solidFill>
+                          <a:effectLst/>
+                          <a:latin typeface="+mj-lt"/>
+                          <a:ea typeface="MS PGothic" charset="0"/>
+                          <a:cs typeface="Arial" charset="0"/>
+                        </a:rPr>
+                      </a:br>
+                      <a:r>
+                        <a:rPr kumimoji="0" lang="en-US" sz="1500" b="0" i="0" u="none" strike="noStrike" cap="none" normalizeH="0" baseline="0" dirty="0">
+                          <a:ln>
+                            <a:noFill/>
+                          </a:ln>
+                          <a:solidFill>
+                            <a:schemeClr val="tx1"/>
+                          </a:solidFill>
+                          <a:effectLst/>
+                          <a:latin typeface="+mj-lt"/>
+                          <a:ea typeface="MS PGothic" charset="0"/>
+                          <a:cs typeface="Arial" charset="0"/>
+                        </a:rPr>
+                        <a:t>#IBMAIX</a:t>
+                      </a:r>
+                    </a:p>
+                    <a:p>
+                      <a:pPr marL="0" marR="0" lvl="0" indent="0" algn="ctr" defTabSz="914400" rtl="0" eaLnBrk="1" fontAlgn="base" latinLnBrk="0" hangingPunct="1">
+                        <a:lnSpc>
+                          <a:spcPct val="120000"/>
+                        </a:lnSpc>
+                        <a:spcBef>
+                          <a:spcPct val="0"/>
+                        </a:spcBef>
+                        <a:spcAft>
+                          <a:spcPct val="0"/>
+                        </a:spcAft>
+                        <a:buClrTx/>
+                        <a:buSzTx/>
+                        <a:buFontTx/>
+                        <a:buNone/>
+                        <a:tabLst/>
+                      </a:pPr>
+                      <a:r>
+                        <a:rPr kumimoji="0" lang="en-US" sz="1500" b="0" i="0" u="none" strike="noStrike" cap="none" normalizeH="0" baseline="0" dirty="0">
+                          <a:ln>
+                            <a:noFill/>
+                          </a:ln>
+                          <a:solidFill>
+                            <a:schemeClr val="tx1"/>
+                          </a:solidFill>
+                          <a:effectLst/>
+                          <a:latin typeface="+mj-lt"/>
+                          <a:ea typeface="MS PGothic" charset="0"/>
+                          <a:cs typeface="Arial" charset="0"/>
+                        </a:rPr>
+                        <a:t>#POWER9</a:t>
+                      </a:r>
+                      <a:br>
+                        <a:rPr kumimoji="0" lang="en-US" sz="1500" b="0" i="0" u="none" strike="noStrike" cap="none" normalizeH="0" baseline="0" dirty="0">
+                          <a:ln>
+                            <a:noFill/>
+                          </a:ln>
+                          <a:solidFill>
+                            <a:schemeClr val="tx1"/>
+                          </a:solidFill>
+                          <a:effectLst/>
+                          <a:latin typeface="+mj-lt"/>
+                          <a:ea typeface="MS PGothic" charset="0"/>
+                          <a:cs typeface="Arial" charset="0"/>
+                        </a:rPr>
+                      </a:br>
+                      <a:r>
+                        <a:rPr kumimoji="0" lang="en-US" sz="1500" b="0" i="0" u="none" strike="noStrike" cap="none" normalizeH="0" baseline="0" dirty="0">
+                          <a:ln>
+                            <a:noFill/>
+                          </a:ln>
+                          <a:solidFill>
+                            <a:schemeClr val="tx1"/>
+                          </a:solidFill>
+                          <a:effectLst/>
+                          <a:latin typeface="+mj-lt"/>
+                          <a:ea typeface="MS PGothic" charset="0"/>
+                          <a:cs typeface="Arial" charset="0"/>
+                        </a:rPr>
+                        <a:t>#</a:t>
+                      </a:r>
+                      <a:r>
+                        <a:rPr kumimoji="0" lang="en-US" sz="1500" b="0" i="0" u="none" strike="noStrike" cap="none" normalizeH="0" baseline="0" dirty="0" err="1">
+                          <a:ln>
+                            <a:noFill/>
+                          </a:ln>
+                          <a:solidFill>
+                            <a:schemeClr val="tx1"/>
+                          </a:solidFill>
+                          <a:effectLst/>
+                          <a:latin typeface="+mj-lt"/>
+                          <a:ea typeface="MS PGothic" charset="0"/>
+                          <a:cs typeface="Arial" charset="0"/>
+                        </a:rPr>
+                        <a:t>LinuxonPower</a:t>
+                      </a:r>
+                      <a:br>
+                        <a:rPr kumimoji="0" lang="en-US" sz="1500" b="0" i="0" u="none" strike="noStrike" cap="none" normalizeH="0" baseline="0" dirty="0">
+                          <a:ln>
+                            <a:noFill/>
+                          </a:ln>
+                          <a:solidFill>
+                            <a:schemeClr val="tx1"/>
+                          </a:solidFill>
+                          <a:effectLst/>
+                          <a:latin typeface="+mj-lt"/>
+                          <a:ea typeface="MS PGothic" charset="0"/>
+                          <a:cs typeface="Arial" charset="0"/>
+                        </a:rPr>
+                      </a:br>
+                      <a:r>
+                        <a:rPr kumimoji="0" lang="en-US" sz="1500" b="0" i="0" u="none" strike="noStrike" cap="none" normalizeH="0" baseline="0" dirty="0">
+                          <a:ln>
+                            <a:noFill/>
+                          </a:ln>
+                          <a:solidFill>
+                            <a:schemeClr val="tx1"/>
+                          </a:solidFill>
+                          <a:effectLst/>
+                          <a:latin typeface="+mj-lt"/>
+                          <a:ea typeface="MS PGothic" charset="0"/>
+                          <a:cs typeface="Arial" charset="0"/>
+                        </a:rPr>
+                        <a:t>#</a:t>
+                      </a:r>
+                      <a:r>
+                        <a:rPr kumimoji="0" lang="en-US" sz="1500" b="0" i="0" u="none" strike="noStrike" cap="none" normalizeH="0" baseline="0" dirty="0" err="1">
+                          <a:ln>
+                            <a:noFill/>
+                          </a:ln>
+                          <a:solidFill>
+                            <a:schemeClr val="tx1"/>
+                          </a:solidFill>
+                          <a:effectLst/>
+                          <a:latin typeface="+mj-lt"/>
+                          <a:ea typeface="MS PGothic" charset="0"/>
+                          <a:cs typeface="Arial" charset="0"/>
+                        </a:rPr>
+                        <a:t>OpenPOWER</a:t>
+                      </a:r>
+                      <a:br>
+                        <a:rPr kumimoji="0" lang="en-US" sz="1500" b="0" i="0" u="none" strike="noStrike" cap="none" normalizeH="0" baseline="0" dirty="0">
+                          <a:ln>
+                            <a:noFill/>
+                          </a:ln>
+                          <a:solidFill>
+                            <a:schemeClr val="tx1"/>
+                          </a:solidFill>
+                          <a:effectLst/>
+                          <a:latin typeface="+mj-lt"/>
+                          <a:ea typeface="MS PGothic" charset="0"/>
+                          <a:cs typeface="Arial" charset="0"/>
+                        </a:rPr>
+                      </a:br>
+                      <a:r>
+                        <a:rPr kumimoji="0" lang="en-US" sz="1500" b="0" i="0" u="none" strike="noStrike" cap="none" normalizeH="0" baseline="0" dirty="0">
+                          <a:ln>
+                            <a:noFill/>
+                          </a:ln>
+                          <a:solidFill>
+                            <a:schemeClr val="tx1"/>
+                          </a:solidFill>
+                          <a:effectLst/>
+                          <a:latin typeface="+mj-lt"/>
+                          <a:ea typeface="MS PGothic" charset="0"/>
+                          <a:cs typeface="Arial" charset="0"/>
+                        </a:rPr>
+                        <a:t>#</a:t>
+                      </a:r>
+                      <a:r>
+                        <a:rPr kumimoji="0" lang="en-US" sz="1500" b="0" i="0" u="none" strike="noStrike" cap="none" normalizeH="0" baseline="0" dirty="0" err="1">
+                          <a:ln>
+                            <a:noFill/>
+                          </a:ln>
+                          <a:solidFill>
+                            <a:schemeClr val="tx1"/>
+                          </a:solidFill>
+                          <a:effectLst/>
+                          <a:latin typeface="+mj-lt"/>
+                          <a:ea typeface="MS PGothic" charset="0"/>
+                          <a:cs typeface="Arial" charset="0"/>
+                        </a:rPr>
+                        <a:t>HANAonPower</a:t>
+                      </a:r>
+                      <a:endParaRPr kumimoji="0" lang="en-US" sz="1500" b="0" i="0" u="none" strike="noStrike" cap="none" normalizeH="0" baseline="0" dirty="0">
+                        <a:ln>
+                          <a:noFill/>
+                        </a:ln>
+                        <a:solidFill>
+                          <a:schemeClr val="tx1"/>
+                        </a:solidFill>
+                        <a:effectLst/>
+                        <a:latin typeface="+mj-lt"/>
+                        <a:ea typeface="MS PGothic" charset="0"/>
+                        <a:cs typeface="Arial" charset="0"/>
+                      </a:endParaRPr>
+                    </a:p>
+                    <a:p>
+                      <a:pPr marL="0" marR="0" lvl="0" indent="0" algn="ctr" defTabSz="914400" rtl="0" eaLnBrk="1" fontAlgn="base" latinLnBrk="0" hangingPunct="1">
+                        <a:lnSpc>
+                          <a:spcPct val="120000"/>
+                        </a:lnSpc>
+                        <a:spcBef>
+                          <a:spcPct val="0"/>
+                        </a:spcBef>
+                        <a:spcAft>
+                          <a:spcPct val="0"/>
+                        </a:spcAft>
+                        <a:buClrTx/>
+                        <a:buSzTx/>
+                        <a:buFont typeface="Arial" charset="0"/>
+                        <a:buNone/>
+                        <a:tabLst/>
+                      </a:pPr>
+                      <a:r>
+                        <a:rPr kumimoji="0" lang="en-US" sz="1500" b="0" i="0" u="none" strike="noStrike" cap="none" normalizeH="0" baseline="0" dirty="0">
+                          <a:ln>
+                            <a:noFill/>
+                          </a:ln>
+                          <a:solidFill>
+                            <a:schemeClr val="tx1"/>
+                          </a:solidFill>
+                          <a:effectLst/>
+                          <a:latin typeface="+mj-lt"/>
+                          <a:ea typeface="MS PGothic" charset="0"/>
+                          <a:cs typeface="Arial" charset="0"/>
+                        </a:rPr>
+                        <a:t>#</a:t>
+                      </a:r>
+                      <a:r>
+                        <a:rPr kumimoji="0" lang="en-US" sz="1500" b="0" i="0" u="none" strike="noStrike" cap="none" normalizeH="0" baseline="0" dirty="0" err="1">
+                          <a:ln>
+                            <a:noFill/>
+                          </a:ln>
+                          <a:solidFill>
+                            <a:schemeClr val="tx1"/>
+                          </a:solidFill>
+                          <a:effectLst/>
+                          <a:latin typeface="+mj-lt"/>
+                          <a:ea typeface="MS PGothic" charset="0"/>
+                          <a:cs typeface="Arial" charset="0"/>
+                        </a:rPr>
+                        <a:t>ITinfrastructure</a:t>
+                      </a:r>
+                      <a:br>
+                        <a:rPr kumimoji="0" lang="en-US" sz="1500" b="0" i="0" u="none" strike="noStrike" cap="none" normalizeH="0" baseline="0" dirty="0">
+                          <a:ln>
+                            <a:noFill/>
+                          </a:ln>
+                          <a:solidFill>
+                            <a:schemeClr val="tx1"/>
+                          </a:solidFill>
+                          <a:effectLst/>
+                          <a:latin typeface="+mj-lt"/>
+                          <a:ea typeface="MS PGothic" charset="0"/>
+                          <a:cs typeface="Arial" charset="0"/>
+                        </a:rPr>
+                      </a:br>
+                      <a:r>
+                        <a:rPr kumimoji="0" lang="en-US" sz="1500" b="0" i="0" u="none" strike="noStrike" cap="none" normalizeH="0" baseline="0" dirty="0">
+                          <a:ln>
+                            <a:noFill/>
+                          </a:ln>
+                          <a:solidFill>
+                            <a:schemeClr val="tx1"/>
+                          </a:solidFill>
+                          <a:effectLst/>
+                          <a:latin typeface="+mj-lt"/>
+                          <a:ea typeface="MS PGothic" charset="0"/>
+                          <a:cs typeface="Arial" charset="0"/>
+                        </a:rPr>
+                        <a:t>#</a:t>
+                      </a:r>
+                      <a:r>
+                        <a:rPr kumimoji="0" lang="en-US" sz="1500" b="0" i="0" u="none" strike="noStrike" cap="none" normalizeH="0" baseline="0" dirty="0" err="1">
+                          <a:ln>
+                            <a:noFill/>
+                          </a:ln>
+                          <a:solidFill>
+                            <a:schemeClr val="tx1"/>
+                          </a:solidFill>
+                          <a:effectLst/>
+                          <a:latin typeface="+mj-lt"/>
+                          <a:ea typeface="MS PGothic" charset="0"/>
+                          <a:cs typeface="Arial" charset="0"/>
+                        </a:rPr>
+                        <a:t>OpenSource</a:t>
+                      </a:r>
+                      <a:br>
+                        <a:rPr kumimoji="0" lang="en-US" sz="1500" b="0" i="0" u="none" strike="noStrike" cap="none" normalizeH="0" baseline="0" dirty="0">
+                          <a:ln>
+                            <a:noFill/>
+                          </a:ln>
+                          <a:solidFill>
+                            <a:schemeClr val="tx1"/>
+                          </a:solidFill>
+                          <a:effectLst/>
+                          <a:latin typeface="+mj-lt"/>
+                          <a:ea typeface="MS PGothic" charset="0"/>
+                          <a:cs typeface="Arial" charset="0"/>
+                        </a:rPr>
+                      </a:br>
+                      <a:r>
+                        <a:rPr kumimoji="0" lang="en-US" sz="1500" b="0" i="0" u="none" strike="noStrike" cap="none" normalizeH="0" baseline="0" dirty="0">
+                          <a:ln>
+                            <a:noFill/>
+                          </a:ln>
+                          <a:solidFill>
+                            <a:schemeClr val="tx1"/>
+                          </a:solidFill>
+                          <a:effectLst/>
+                          <a:latin typeface="+mj-lt"/>
+                          <a:ea typeface="MS PGothic" charset="0"/>
+                          <a:cs typeface="Arial" charset="0"/>
+                        </a:rPr>
+                        <a:t>#</a:t>
+                      </a:r>
+                      <a:r>
+                        <a:rPr kumimoji="0" lang="en-US" sz="1500" b="0" i="0" u="none" strike="noStrike" cap="none" normalizeH="0" baseline="0" dirty="0" err="1">
+                          <a:ln>
+                            <a:noFill/>
+                          </a:ln>
+                          <a:solidFill>
+                            <a:schemeClr val="tx1"/>
+                          </a:solidFill>
+                          <a:effectLst/>
+                          <a:latin typeface="+mj-lt"/>
+                          <a:ea typeface="MS PGothic" charset="0"/>
+                          <a:cs typeface="Arial" charset="0"/>
+                        </a:rPr>
+                        <a:t>HybridCloud</a:t>
+                      </a:r>
+                      <a:endParaRPr kumimoji="0" lang="en-US" sz="1500" b="0" i="0" u="none" strike="noStrike" cap="none" normalizeH="0" baseline="0" dirty="0">
+                        <a:ln>
+                          <a:noFill/>
+                        </a:ln>
+                        <a:solidFill>
+                          <a:schemeClr val="tx1"/>
+                        </a:solidFill>
+                        <a:effectLst/>
+                        <a:latin typeface="+mj-lt"/>
+                        <a:ea typeface="MS PGothic" charset="0"/>
+                        <a:cs typeface="Arial" charset="0"/>
+                      </a:endParaRPr>
+                    </a:p>
+                    <a:p>
+                      <a:pPr marL="0" marR="0" lvl="0" indent="0" algn="ctr" defTabSz="914400" rtl="0" eaLnBrk="1" fontAlgn="base" latinLnBrk="0" hangingPunct="1">
+                        <a:lnSpc>
+                          <a:spcPct val="120000"/>
+                        </a:lnSpc>
+                        <a:spcBef>
+                          <a:spcPct val="0"/>
+                        </a:spcBef>
+                        <a:spcAft>
+                          <a:spcPct val="0"/>
+                        </a:spcAft>
+                        <a:buClrTx/>
+                        <a:buSzTx/>
+                        <a:buFont typeface="Arial" charset="0"/>
+                        <a:buNone/>
+                        <a:tabLst/>
+                      </a:pPr>
+                      <a:r>
+                        <a:rPr kumimoji="0" lang="en-US" sz="1500" b="0" i="0" u="none" strike="noStrike" cap="none" normalizeH="0" baseline="0" dirty="0">
+                          <a:ln>
+                            <a:noFill/>
+                          </a:ln>
+                          <a:solidFill>
+                            <a:schemeClr val="tx1"/>
+                          </a:solidFill>
+                          <a:effectLst/>
+                          <a:latin typeface="+mj-lt"/>
+                          <a:ea typeface="MS PGothic" charset="0"/>
+                          <a:cs typeface="Arial" charset="0"/>
+                        </a:rPr>
+                        <a:t>#</a:t>
+                      </a:r>
+                      <a:r>
+                        <a:rPr kumimoji="0" lang="en-US" sz="1500" b="0" i="0" u="none" strike="noStrike" cap="none" normalizeH="0" baseline="0" dirty="0" err="1">
+                          <a:ln>
+                            <a:noFill/>
+                          </a:ln>
+                          <a:solidFill>
+                            <a:schemeClr val="tx1"/>
+                          </a:solidFill>
+                          <a:effectLst/>
+                          <a:latin typeface="+mj-lt"/>
+                          <a:ea typeface="MS PGothic" charset="0"/>
+                          <a:cs typeface="Arial" charset="0"/>
+                        </a:rPr>
+                        <a:t>BigData</a:t>
+                      </a:r>
+                      <a:endParaRPr kumimoji="0" lang="en-US" sz="1500" b="0" i="0" u="none" strike="noStrike" cap="none" normalizeH="0" baseline="0" dirty="0">
+                        <a:ln>
+                          <a:noFill/>
+                        </a:ln>
+                        <a:solidFill>
+                          <a:schemeClr val="tx1"/>
+                        </a:solidFill>
+                        <a:effectLst/>
+                        <a:latin typeface="+mj-lt"/>
+                        <a:ea typeface="MS PGothic" charset="0"/>
+                        <a:cs typeface="Arial" charset="0"/>
+                      </a:endParaRPr>
+                    </a:p>
+                  </a:txBody>
+                  <a:tcPr marL="121927" marR="121927" marT="45691" marB="45691" anchor="ctr" horzOverflow="overflow">
+                    <a:lnL w="12700" cap="flat" cmpd="sng" algn="ctr">
+                      <a:solidFill>
+                        <a:srgbClr val="000000"/>
+                      </a:solidFill>
+                      <a:prstDash val="solid"/>
+                      <a:round/>
+                      <a:headEnd type="none" w="med" len="med"/>
+                      <a:tailEnd type="none" w="med" len="med"/>
+                    </a:lnL>
+                    <a:lnR w="12700" cap="flat" cmpd="sng" algn="ctr">
+                      <a:solidFill>
+                        <a:srgbClr val="000000"/>
+                      </a:solidFill>
+                      <a:prstDash val="solid"/>
+                      <a:round/>
+                      <a:headEnd type="none" w="med" len="med"/>
+                      <a:tailEnd type="none" w="med" len="med"/>
+                    </a:lnR>
+                    <a:lnT w="12700" cap="flat" cmpd="sng" algn="ctr">
+                      <a:solidFill>
+                        <a:srgbClr val="000000"/>
+                      </a:solidFill>
+                      <a:prstDash val="solid"/>
+                      <a:round/>
+                      <a:headEnd type="none" w="med" len="med"/>
+                      <a:tailEnd type="none" w="med" len="med"/>
+                    </a:lnT>
+                    <a:lnB w="12700" cap="flat" cmpd="sng" algn="ctr">
+                      <a:solidFill>
+                        <a:srgbClr val="000000"/>
+                      </a:solidFill>
+                      <a:prstDash val="solid"/>
+                      <a:round/>
+                      <a:headEnd type="none" w="med" len="med"/>
+                      <a:tailEnd type="none" w="med" len="med"/>
+                    </a:lnB>
+                    <a:lnTlToBr>
+                      <a:noFill/>
+                    </a:lnTlToBr>
+                    <a:lnBlToTr>
+                      <a:noFill/>
+                    </a:lnBlToTr>
+                    <a:solidFill>
+                      <a:schemeClr val="bg2"/>
+                    </a:solidFill>
+                  </a:tcPr>
+                </a:tc>
+                <a:extLst>
+                  <a:ext uri="{0D108BD9-81ED-4DB2-BD59-A6C34878D82A}">
+                    <a16:rowId xmlns:a16="http://schemas.microsoft.com/office/drawing/2014/main" val="10001"/>
+                  </a:ext>
+                </a:extLst>
+              </a:tr>
+            </a:tbl>
+          </a:graphicData>
+        </a:graphic>
+      </p:graphicFrame>
+      <p:pic>
+        <p:nvPicPr>
+          <p:cNvPr id="7185" name="Picture 5"/>
+          <p:cNvPicPr>
+            <a:picLocks noChangeAspect="1"/>
+          </p:cNvPicPr>
+          <p:nvPr/>
+        </p:nvPicPr>
+        <p:blipFill>
+          <a:blip r:embed="rId16" cstate="screen">
+            <a:extLst>
+              <a:ext uri="{28A0092B-C50C-407E-A947-70E740481C1C}">
+                <a14:useLocalDpi xmlns:a14="http://schemas.microsoft.com/office/drawing/2010/main"/>
+              </a:ext>
+            </a:extLst>
+          </a:blip>
+          <a:srcRect/>
+          <a:stretch>
+            <a:fillRect/>
+          </a:stretch>
+        </p:blipFill>
+        <p:spPr bwMode="auto">
+          <a:xfrm>
+            <a:off x="8394700" y="1851948"/>
+            <a:ext cx="540144" cy="490872"/>
+          </a:xfrm>
+          <a:prstGeom prst="rect">
+            <a:avLst/>
+          </a:prstGeom>
+          <a:noFill/>
+          <a:ln>
+            <a:noFill/>
+          </a:ln>
+          <a:extLst>
+            <a:ext uri="{909E8E84-426E-40dd-AFC4-6F175D3DCCD1}">
+              <a14:hiddenFill xmlns="" xmlns:a14="http://schemas.microsoft.com/office/drawing/2010/main">
+                <a:solidFill>
+                  <a:srgbClr val="FFFFFF"/>
+                </a:solidFill>
+              </a14:hiddenFill>
+            </a:ext>
+            <a:ext uri="{91240B29-F687-4f45-9708-019B960494DF}">
+              <a14:hiddenLine xmlns="" xmlns:a14="http://schemas.microsoft.com/office/drawing/2010/main" w="9525">
+                <a:solidFill>
+                  <a:srgbClr val="000000"/>
+                </a:solidFill>
+                <a:miter lim="800000"/>
+                <a:headEnd/>
+                <a:tailEnd/>
+              </a14:hiddenLine>
+            </a:ext>
+          </a:extLst>
+        </p:spPr>
+      </p:pic>
+    </p:spTree>
+    <p:extLst>
+      <p:ext uri="{BB962C8B-B14F-4D97-AF65-F5344CB8AC3E}">
+        <p14:creationId xmlns:p14="http://schemas.microsoft.com/office/powerpoint/2010/main" val="324082227"/>
+      </p:ext>
+    </p:extLst>
+  </p:cSld>
+  <p:clrMapOvr>
+    <a:masterClrMapping/>
+  </p:clrMapOvr>
+</p:sld>
+</file>
+
+<file path=ppt/slides/slide26.xml><?xml version="1.0" encoding="utf-8"?>
+<p:sld xmlns:a="http://schemas.openxmlformats.org/drawingml/2006/main" xmlns:r="http://schemas.openxmlformats.org/officeDocument/2006/relationships" xmlns:p="http://schemas.openxmlformats.org/presentationml/2006/main">
+  <p:cSld>
+    <p:spTree>
+      <p:nvGrpSpPr>
+        <p:cNvPr id="1" name=""/>
+        <p:cNvGrpSpPr/>
+        <p:nvPr/>
+      </p:nvGrpSpPr>
+      <p:grpSpPr>
+        <a:xfrm>
+          <a:off x="0" y="0"/>
+          <a:ext cx="0" cy="0"/>
+          <a:chOff x="0" y="0"/>
+          <a:chExt cx="0" cy="0"/>
+        </a:xfrm>
+      </p:grpSpPr>
+    </p:spTree>
+    <p:extLst>
+      <p:ext uri="{BB962C8B-B14F-4D97-AF65-F5344CB8AC3E}">
+        <p14:creationId xmlns:p14="http://schemas.microsoft.com/office/powerpoint/2010/main" val="1643754911"/>
       </p:ext>
     </p:extLst>
   </p:cSld>
@@ -26916,6 +30251,49 @@
           </a:p>
         </p:txBody>
       </p:sp>
+      <p:pic>
+        <p:nvPicPr>
+          <p:cNvPr id="2" name="Graphic 1">
+            <a:extLst>
+              <a:ext uri="{FF2B5EF4-FFF2-40B4-BE49-F238E27FC236}">
+                <a16:creationId xmlns:a16="http://schemas.microsoft.com/office/drawing/2014/main" id="{01B9ABCB-3BE1-C533-13D7-4B2E061368EB}"/>
+              </a:ext>
+            </a:extLst>
+          </p:cNvPr>
+          <p:cNvPicPr>
+            <a:picLocks noChangeAspect="1"/>
+          </p:cNvPicPr>
+          <p:nvPr/>
+        </p:nvPicPr>
+        <p:blipFill>
+          <a:blip r:embed="rId2">
+            <a:extLst>
+              <a:ext uri="{96DAC541-7B7A-43D3-8B79-37D633B846F1}">
+                <asvg:svgBlip xmlns:asvg="http://schemas.microsoft.com/office/drawing/2016/SVG/main" r:embed="rId3"/>
+              </a:ext>
+            </a:extLst>
+          </a:blip>
+          <a:stretch>
+            <a:fillRect/>
+          </a:stretch>
+        </p:blipFill>
+        <p:spPr>
+          <a:xfrm>
+            <a:off x="2921901" y="1615281"/>
+            <a:ext cx="630000" cy="630000"/>
+          </a:xfrm>
+          <a:prstGeom prst="rect">
+            <a:avLst/>
+          </a:prstGeom>
+          <a:effectLst>
+            <a:outerShdw blurRad="50800" dist="38100" dir="2700000" algn="tl" rotWithShape="0">
+              <a:prstClr val="black">
+                <a:alpha val="40000"/>
+              </a:prstClr>
+            </a:outerShdw>
+          </a:effectLst>
+        </p:spPr>
+      </p:pic>
     </p:spTree>
     <p:extLst>
       <p:ext uri="{BB962C8B-B14F-4D97-AF65-F5344CB8AC3E}">

</xml_diff>